<commit_message>
Added more fun graphs
</commit_message>
<xml_diff>
--- a/Vilhuber-Presentation2019-Montreal-2019-04-05.pptx
+++ b/Vilhuber-Presentation2019-Montreal-2019-04-05.pptx
@@ -5,7 +5,7 @@
     <p:sldMasterId id="2147483648" r:id="rId1"/>
   </p:sldMasterIdLst>
   <p:notesMasterIdLst>
-    <p:notesMasterId r:id="rId97"/>
+    <p:notesMasterId r:id="rId104"/>
   </p:notesMasterIdLst>
   <p:sldIdLst>
     <p:sldId id="256" r:id="rId2"/>
@@ -95,37 +95,44 @@
     <p:sldId id="693" r:id="rId86"/>
     <p:sldId id="736" r:id="rId87"/>
     <p:sldId id="737" r:id="rId88"/>
-    <p:sldId id="738" r:id="rId89"/>
-    <p:sldId id="495" r:id="rId90"/>
-    <p:sldId id="741" r:id="rId91"/>
-    <p:sldId id="742" r:id="rId92"/>
-    <p:sldId id="739" r:id="rId93"/>
-    <p:sldId id="694" r:id="rId94"/>
-    <p:sldId id="740" r:id="rId95"/>
-    <p:sldId id="416" r:id="rId96"/>
+    <p:sldId id="744" r:id="rId89"/>
+    <p:sldId id="743" r:id="rId90"/>
+    <p:sldId id="745" r:id="rId91"/>
+    <p:sldId id="746" r:id="rId92"/>
+    <p:sldId id="747" r:id="rId93"/>
+    <p:sldId id="748" r:id="rId94"/>
+    <p:sldId id="738" r:id="rId95"/>
+    <p:sldId id="749" r:id="rId96"/>
+    <p:sldId id="495" r:id="rId97"/>
+    <p:sldId id="741" r:id="rId98"/>
+    <p:sldId id="742" r:id="rId99"/>
+    <p:sldId id="739" r:id="rId100"/>
+    <p:sldId id="694" r:id="rId101"/>
+    <p:sldId id="740" r:id="rId102"/>
+    <p:sldId id="416" r:id="rId103"/>
   </p:sldIdLst>
   <p:sldSz cx="12192000" cy="6858000"/>
   <p:notesSz cx="6858000" cy="9144000"/>
   <p:embeddedFontLst>
     <p:embeddedFont>
-      <p:font typeface="Century" panose="02040604050505020304" pitchFamily="18" charset="0"/>
-      <p:regular r:id="rId98"/>
+      <p:font typeface="Calibri Light" panose="020F0302020204030204" pitchFamily="34" charset="0"/>
+      <p:regular r:id="rId105"/>
+      <p:italic r:id="rId106"/>
     </p:embeddedFont>
     <p:embeddedFont>
       <p:font typeface="Calibri" panose="020F0502020204030204" pitchFamily="34" charset="0"/>
-      <p:regular r:id="rId99"/>
-      <p:bold r:id="rId100"/>
-      <p:italic r:id="rId101"/>
-      <p:boldItalic r:id="rId102"/>
+      <p:regular r:id="rId107"/>
+      <p:bold r:id="rId108"/>
+      <p:italic r:id="rId109"/>
+      <p:boldItalic r:id="rId110"/>
     </p:embeddedFont>
     <p:embeddedFont>
-      <p:font typeface="Calibri Light" panose="020F0302020204030204" pitchFamily="34" charset="0"/>
-      <p:regular r:id="rId103"/>
-      <p:italic r:id="rId104"/>
+      <p:font typeface="Roboto" panose="020B0604020202020204" charset="0"/>
+      <p:regular r:id="rId111"/>
     </p:embeddedFont>
     <p:embeddedFont>
-      <p:font typeface="Roboto" panose="02000000000000000000" pitchFamily="2" charset="0"/>
-      <p:regular r:id="rId105"/>
+      <p:font typeface="Century" panose="02040604050505020304" pitchFamily="18" charset="0"/>
+      <p:regular r:id="rId112"/>
     </p:embeddedFont>
   </p:embeddedFontLst>
   <p:defaultTextStyle>
@@ -246,7 +253,6 @@
   </mc:AlternateContent>
   <c:chart>
     <c:title>
-      <c:layout/>
       <c:overlay val="0"/>
       <c:spPr>
         <a:noFill/>
@@ -1261,7 +1267,6 @@
     </c:plotArea>
     <c:legend>
       <c:legendPos val="b"/>
-      <c:layout/>
       <c:overlay val="0"/>
       <c:spPr>
         <a:noFill/>
@@ -1333,7 +1338,6 @@
   </mc:AlternateContent>
   <c:chart>
     <c:title>
-      <c:layout/>
       <c:overlay val="0"/>
       <c:spPr>
         <a:noFill/>
@@ -2348,7 +2352,6 @@
     </c:plotArea>
     <c:legend>
       <c:legendPos val="b"/>
-      <c:layout/>
       <c:overlay val="0"/>
       <c:spPr>
         <a:noFill/>
@@ -3637,7 +3640,7 @@
           <a:p>
             <a:fld id="{49A8C565-F3BF-4A84-AE07-9A89EABD0C05}" type="datetimeFigureOut">
               <a:rPr lang="en-US" smtClean="0"/>
-              <a:t>2019-04-04</a:t>
+              <a:t>2019-04-05</a:t>
             </a:fld>
             <a:endParaRPr lang="en-US"/>
           </a:p>
@@ -5476,7 +5479,7 @@
           <a:p>
             <a:fld id="{D098DA53-2AE6-479B-901D-5117A0B269E4}" type="datetimeFigureOut">
               <a:rPr lang="en-US" smtClean="0"/>
-              <a:t>2019-04-04</a:t>
+              <a:t>2019-04-05</a:t>
             </a:fld>
             <a:endParaRPr lang="en-US"/>
           </a:p>
@@ -5832,7 +5835,7 @@
           <a:p>
             <a:fld id="{D098DA53-2AE6-479B-901D-5117A0B269E4}" type="datetimeFigureOut">
               <a:rPr lang="en-US" smtClean="0"/>
-              <a:t>2019-04-04</a:t>
+              <a:t>2019-04-05</a:t>
             </a:fld>
             <a:endParaRPr lang="en-US"/>
           </a:p>
@@ -6084,7 +6087,7 @@
           <a:p>
             <a:fld id="{D098DA53-2AE6-479B-901D-5117A0B269E4}" type="datetimeFigureOut">
               <a:rPr lang="en-US" smtClean="0"/>
-              <a:t>2019-04-04</a:t>
+              <a:t>2019-04-05</a:t>
             </a:fld>
             <a:endParaRPr lang="en-US"/>
           </a:p>
@@ -6252,7 +6255,7 @@
           <a:p>
             <a:fld id="{D098DA53-2AE6-479B-901D-5117A0B269E4}" type="datetimeFigureOut">
               <a:rPr lang="en-US" smtClean="0"/>
-              <a:t>2019-04-04</a:t>
+              <a:t>2019-04-05</a:t>
             </a:fld>
             <a:endParaRPr lang="en-US"/>
           </a:p>
@@ -6430,7 +6433,7 @@
           <a:p>
             <a:fld id="{D098DA53-2AE6-479B-901D-5117A0B269E4}" type="datetimeFigureOut">
               <a:rPr lang="en-US" smtClean="0"/>
-              <a:t>2019-04-04</a:t>
+              <a:t>2019-04-05</a:t>
             </a:fld>
             <a:endParaRPr lang="en-US"/>
           </a:p>
@@ -6706,7 +6709,7 @@
           <a:p>
             <a:fld id="{D098DA53-2AE6-479B-901D-5117A0B269E4}" type="datetimeFigureOut">
               <a:rPr lang="en-US" smtClean="0"/>
-              <a:t>2019-04-04</a:t>
+              <a:t>2019-04-05</a:t>
             </a:fld>
             <a:endParaRPr lang="en-US"/>
           </a:p>
@@ -6909,7 +6912,7 @@
           <a:p>
             <a:fld id="{D098DA53-2AE6-479B-901D-5117A0B269E4}" type="datetimeFigureOut">
               <a:rPr lang="en-US" smtClean="0"/>
-              <a:t>2019-04-04</a:t>
+              <a:t>2019-04-05</a:t>
             </a:fld>
             <a:endParaRPr lang="en-US"/>
           </a:p>
@@ -7178,7 +7181,7 @@
           <a:p>
             <a:fld id="{D098DA53-2AE6-479B-901D-5117A0B269E4}" type="datetimeFigureOut">
               <a:rPr lang="en-US" smtClean="0"/>
-              <a:t>2019-04-04</a:t>
+              <a:t>2019-04-05</a:t>
             </a:fld>
             <a:endParaRPr lang="en-US"/>
           </a:p>
@@ -7504,7 +7507,7 @@
           <a:p>
             <a:fld id="{D098DA53-2AE6-479B-901D-5117A0B269E4}" type="datetimeFigureOut">
               <a:rPr lang="en-US" smtClean="0"/>
-              <a:t>2019-04-04</a:t>
+              <a:t>2019-04-05</a:t>
             </a:fld>
             <a:endParaRPr lang="en-US"/>
           </a:p>
@@ -7812,7 +7815,7 @@
           <a:p>
             <a:fld id="{D098DA53-2AE6-479B-901D-5117A0B269E4}" type="datetimeFigureOut">
               <a:rPr lang="en-US" smtClean="0"/>
-              <a:t>2019-04-04</a:t>
+              <a:t>2019-04-05</a:t>
             </a:fld>
             <a:endParaRPr lang="en-US"/>
           </a:p>
@@ -8250,7 +8253,7 @@
           <a:p>
             <a:fld id="{D098DA53-2AE6-479B-901D-5117A0B269E4}" type="datetimeFigureOut">
               <a:rPr lang="en-US" smtClean="0"/>
-              <a:t>2019-04-04</a:t>
+              <a:t>2019-04-05</a:t>
             </a:fld>
             <a:endParaRPr lang="en-US"/>
           </a:p>
@@ -8441,7 +8444,7 @@
           <a:p>
             <a:fld id="{D098DA53-2AE6-479B-901D-5117A0B269E4}" type="datetimeFigureOut">
               <a:rPr lang="en-US" smtClean="0"/>
-              <a:t>2019-04-04</a:t>
+              <a:t>2019-04-05</a:t>
             </a:fld>
             <a:endParaRPr lang="en-US"/>
           </a:p>
@@ -8536,7 +8539,7 @@
           <a:p>
             <a:fld id="{D098DA53-2AE6-479B-901D-5117A0B269E4}" type="datetimeFigureOut">
               <a:rPr lang="en-US" smtClean="0"/>
-              <a:t>2019-04-04</a:t>
+              <a:t>2019-04-05</a:t>
             </a:fld>
             <a:endParaRPr lang="en-US"/>
           </a:p>
@@ -8747,7 +8750,7 @@
           <a:p>
             <a:fld id="{D098DA53-2AE6-479B-901D-5117A0B269E4}" type="datetimeFigureOut">
               <a:rPr lang="en-US" smtClean="0"/>
-              <a:t>2019-04-04</a:t>
+              <a:t>2019-04-05</a:t>
             </a:fld>
             <a:endParaRPr lang="en-US"/>
           </a:p>
@@ -10262,6 +10265,369 @@
       </p:transition>
     </mc:Fallback>
   </mc:AlternateContent>
+  <p:timing>
+    <p:tnLst>
+      <p:par>
+        <p:cTn id="1" dur="indefinite" restart="never" nodeType="tmRoot"/>
+      </p:par>
+    </p:tnLst>
+  </p:timing>
+</p:sld>
+</file>
+
+<file path=ppt/slides/slide100.xml><?xml version="1.0" encoding="utf-8"?>
+<p:sld xmlns:a="http://schemas.openxmlformats.org/drawingml/2006/main" xmlns:r="http://schemas.openxmlformats.org/officeDocument/2006/relationships" xmlns:p="http://schemas.openxmlformats.org/presentationml/2006/main">
+  <p:cSld>
+    <p:spTree>
+      <p:nvGrpSpPr>
+        <p:cNvPr id="1" name=""/>
+        <p:cNvGrpSpPr/>
+        <p:nvPr/>
+      </p:nvGrpSpPr>
+      <p:grpSpPr>
+        <a:xfrm>
+          <a:off x="0" y="0"/>
+          <a:ext cx="0" cy="0"/>
+          <a:chOff x="0" y="0"/>
+          <a:chExt cx="0" cy="0"/>
+        </a:xfrm>
+      </p:grpSpPr>
+      <p:sp>
+        <p:nvSpPr>
+          <p:cNvPr id="5" name="Title 4"/>
+          <p:cNvSpPr>
+            <a:spLocks noGrp="1"/>
+          </p:cNvSpPr>
+          <p:nvPr>
+            <p:ph type="title"/>
+          </p:nvPr>
+        </p:nvSpPr>
+        <p:spPr/>
+        <p:txBody>
+          <a:bodyPr/>
+          <a:lstStyle/>
+          <a:p>
+            <a:r>
+              <a:rPr lang="en-US" dirty="0" smtClean="0"/>
+              <a:t>Goals</a:t>
+            </a:r>
+            <a:endParaRPr lang="en-US" dirty="0"/>
+          </a:p>
+        </p:txBody>
+      </p:sp>
+      <p:sp>
+        <p:nvSpPr>
+          <p:cNvPr id="6" name="Content Placeholder 5"/>
+          <p:cNvSpPr>
+            <a:spLocks noGrp="1"/>
+          </p:cNvSpPr>
+          <p:nvPr>
+            <p:ph idx="1"/>
+          </p:nvPr>
+        </p:nvSpPr>
+        <p:spPr/>
+        <p:txBody>
+          <a:bodyPr>
+            <a:normAutofit/>
+          </a:bodyPr>
+          <a:lstStyle/>
+          <a:p>
+            <a:r>
+              <a:rPr lang="en-US" sz="4000" b="1" dirty="0" smtClean="0">
+                <a:solidFill>
+                  <a:schemeClr val="accent1">
+                    <a:lumMod val="50000"/>
+                  </a:schemeClr>
+                </a:solidFill>
+              </a:rPr>
+              <a:t>Greater transparency</a:t>
+            </a:r>
+          </a:p>
+          <a:p>
+            <a:pPr lvl="1"/>
+            <a:r>
+              <a:rPr lang="en-US" sz="3600" dirty="0" smtClean="0"/>
+              <a:t>Equal treatment of public-use and confidential data</a:t>
+            </a:r>
+          </a:p>
+          <a:p>
+            <a:r>
+              <a:rPr lang="en-US" sz="4000" b="1" dirty="0" smtClean="0">
+                <a:solidFill>
+                  <a:schemeClr val="accent6">
+                    <a:lumMod val="75000"/>
+                  </a:schemeClr>
+                </a:solidFill>
+              </a:rPr>
+              <a:t>Better computational reproducibility</a:t>
+            </a:r>
+          </a:p>
+          <a:p>
+            <a:pPr lvl="1"/>
+            <a:r>
+              <a:rPr lang="en-US" sz="3600" dirty="0" smtClean="0"/>
+              <a:t>For public data as well as confidential data</a:t>
+            </a:r>
+          </a:p>
+          <a:p>
+            <a:r>
+              <a:rPr lang="en-US" sz="4000" b="1" dirty="0" smtClean="0">
+                <a:solidFill>
+                  <a:schemeClr val="accent4">
+                    <a:lumMod val="75000"/>
+                  </a:schemeClr>
+                </a:solidFill>
+              </a:rPr>
+              <a:t>Greater reliance on shared resources</a:t>
+            </a:r>
+          </a:p>
+          <a:p>
+            <a:pPr lvl="1"/>
+            <a:r>
+              <a:rPr lang="en-US" sz="3600" dirty="0" smtClean="0"/>
+              <a:t>Encourage best practices</a:t>
+            </a:r>
+          </a:p>
+        </p:txBody>
+      </p:sp>
+    </p:spTree>
+    <p:extLst>
+      <p:ext uri="{BB962C8B-B14F-4D97-AF65-F5344CB8AC3E}">
+        <p14:creationId xmlns:p14="http://schemas.microsoft.com/office/powerpoint/2010/main" val="3911607236"/>
+      </p:ext>
+    </p:extLst>
+  </p:cSld>
+  <p:clrMapOvr>
+    <a:masterClrMapping/>
+  </p:clrMapOvr>
+  <p:timing>
+    <p:tnLst>
+      <p:par>
+        <p:cTn id="1" dur="indefinite" restart="never" nodeType="tmRoot"/>
+      </p:par>
+    </p:tnLst>
+  </p:timing>
+</p:sld>
+</file>
+
+<file path=ppt/slides/slide101.xml><?xml version="1.0" encoding="utf-8"?>
+<p:sld xmlns:a="http://schemas.openxmlformats.org/drawingml/2006/main" xmlns:r="http://schemas.openxmlformats.org/officeDocument/2006/relationships" xmlns:p="http://schemas.openxmlformats.org/presentationml/2006/main">
+  <p:cSld>
+    <p:spTree>
+      <p:nvGrpSpPr>
+        <p:cNvPr id="1" name=""/>
+        <p:cNvGrpSpPr/>
+        <p:nvPr/>
+      </p:nvGrpSpPr>
+      <p:grpSpPr>
+        <a:xfrm>
+          <a:off x="0" y="0"/>
+          <a:ext cx="0" cy="0"/>
+          <a:chOff x="0" y="0"/>
+          <a:chExt cx="0" cy="0"/>
+        </a:xfrm>
+      </p:grpSpPr>
+      <p:sp>
+        <p:nvSpPr>
+          <p:cNvPr id="5" name="Title 4"/>
+          <p:cNvSpPr>
+            <a:spLocks noGrp="1"/>
+          </p:cNvSpPr>
+          <p:nvPr>
+            <p:ph type="title"/>
+          </p:nvPr>
+        </p:nvSpPr>
+        <p:spPr/>
+        <p:txBody>
+          <a:bodyPr/>
+          <a:lstStyle/>
+          <a:p>
+            <a:r>
+              <a:rPr lang="en-US" dirty="0" smtClean="0"/>
+              <a:t>Challenges for Restricted-Access Data</a:t>
+            </a:r>
+            <a:endParaRPr lang="en-US" dirty="0"/>
+          </a:p>
+        </p:txBody>
+      </p:sp>
+      <p:sp>
+        <p:nvSpPr>
+          <p:cNvPr id="6" name="Content Placeholder 5"/>
+          <p:cNvSpPr>
+            <a:spLocks noGrp="1"/>
+          </p:cNvSpPr>
+          <p:nvPr>
+            <p:ph idx="1"/>
+          </p:nvPr>
+        </p:nvSpPr>
+        <p:spPr/>
+        <p:txBody>
+          <a:bodyPr>
+            <a:normAutofit/>
+          </a:bodyPr>
+          <a:lstStyle/>
+          <a:p>
+            <a:r>
+              <a:rPr lang="en-US" sz="4000" b="1" dirty="0" smtClean="0">
+                <a:solidFill>
+                  <a:schemeClr val="accent1">
+                    <a:lumMod val="50000"/>
+                  </a:schemeClr>
+                </a:solidFill>
+              </a:rPr>
+              <a:t>Verifiability</a:t>
+            </a:r>
+          </a:p>
+          <a:p>
+            <a:pPr lvl="1"/>
+            <a:r>
+              <a:rPr lang="en-US" sz="3600" dirty="0" smtClean="0"/>
+              <a:t>How can others obtain access?</a:t>
+            </a:r>
+          </a:p>
+          <a:p>
+            <a:r>
+              <a:rPr lang="en-US" sz="4000" b="1" dirty="0" smtClean="0">
+                <a:solidFill>
+                  <a:schemeClr val="accent6">
+                    <a:lumMod val="75000"/>
+                  </a:schemeClr>
+                </a:solidFill>
+              </a:rPr>
+              <a:t>Documentation</a:t>
+            </a:r>
+          </a:p>
+          <a:p>
+            <a:pPr lvl="1"/>
+            <a:r>
+              <a:rPr lang="en-US" sz="3600" dirty="0" smtClean="0"/>
+              <a:t>How can others learn about the data?</a:t>
+            </a:r>
+          </a:p>
+          <a:p>
+            <a:r>
+              <a:rPr lang="en-US" sz="4000" b="1" dirty="0" smtClean="0">
+                <a:solidFill>
+                  <a:schemeClr val="accent4">
+                    <a:lumMod val="75000"/>
+                  </a:schemeClr>
+                </a:solidFill>
+              </a:rPr>
+              <a:t>Persistence</a:t>
+            </a:r>
+          </a:p>
+          <a:p>
+            <a:pPr lvl="1"/>
+            <a:r>
+              <a:rPr lang="en-US" sz="3600" dirty="0" smtClean="0"/>
+              <a:t>How are data and programs preserved?</a:t>
+            </a:r>
+          </a:p>
+        </p:txBody>
+      </p:sp>
+    </p:spTree>
+    <p:extLst>
+      <p:ext uri="{BB962C8B-B14F-4D97-AF65-F5344CB8AC3E}">
+        <p14:creationId xmlns:p14="http://schemas.microsoft.com/office/powerpoint/2010/main" val="401567628"/>
+      </p:ext>
+    </p:extLst>
+  </p:cSld>
+  <p:clrMapOvr>
+    <a:masterClrMapping/>
+  </p:clrMapOvr>
+  <p:timing>
+    <p:tnLst>
+      <p:par>
+        <p:cTn id="1" dur="indefinite" restart="never" nodeType="tmRoot"/>
+      </p:par>
+    </p:tnLst>
+  </p:timing>
+</p:sld>
+</file>
+
+<file path=ppt/slides/slide102.xml><?xml version="1.0" encoding="utf-8"?>
+<p:sld xmlns:a="http://schemas.openxmlformats.org/drawingml/2006/main" xmlns:r="http://schemas.openxmlformats.org/officeDocument/2006/relationships" xmlns:p="http://schemas.openxmlformats.org/presentationml/2006/main">
+  <p:cSld>
+    <p:bg>
+      <p:bgPr>
+        <a:solidFill>
+          <a:schemeClr val="tx1"/>
+        </a:solidFill>
+        <a:effectLst/>
+      </p:bgPr>
+    </p:bg>
+    <p:spTree>
+      <p:nvGrpSpPr>
+        <p:cNvPr id="1" name=""/>
+        <p:cNvGrpSpPr/>
+        <p:nvPr/>
+      </p:nvGrpSpPr>
+      <p:grpSpPr>
+        <a:xfrm>
+          <a:off x="0" y="0"/>
+          <a:ext cx="0" cy="0"/>
+          <a:chOff x="0" y="0"/>
+          <a:chExt cx="0" cy="0"/>
+        </a:xfrm>
+      </p:grpSpPr>
+      <p:sp>
+        <p:nvSpPr>
+          <p:cNvPr id="2" name="Rectangle 1"/>
+          <p:cNvSpPr/>
+          <p:nvPr/>
+        </p:nvSpPr>
+        <p:spPr>
+          <a:xfrm>
+            <a:off x="2832100" y="1981200"/>
+            <a:ext cx="7239000" cy="2590800"/>
+          </a:xfrm>
+          <a:prstGeom prst="rect">
+            <a:avLst/>
+          </a:prstGeom>
+          <a:noFill/>
+          <a:ln>
+            <a:noFill/>
+          </a:ln>
+        </p:spPr>
+        <p:style>
+          <a:lnRef idx="2">
+            <a:schemeClr val="accent1">
+              <a:shade val="50000"/>
+            </a:schemeClr>
+          </a:lnRef>
+          <a:fillRef idx="1">
+            <a:schemeClr val="accent1"/>
+          </a:fillRef>
+          <a:effectRef idx="0">
+            <a:schemeClr val="accent1"/>
+          </a:effectRef>
+          <a:fontRef idx="minor">
+            <a:schemeClr val="lt1"/>
+          </a:fontRef>
+        </p:style>
+        <p:txBody>
+          <a:bodyPr rtlCol="0" anchor="ctr"/>
+          <a:lstStyle/>
+          <a:p>
+            <a:pPr algn="ctr"/>
+            <a:r>
+              <a:rPr lang="en-US" sz="6600" b="1" smtClean="0"/>
+              <a:t>Merci!</a:t>
+            </a:r>
+            <a:endParaRPr lang="en-US" sz="6600" b="1" dirty="0"/>
+          </a:p>
+        </p:txBody>
+      </p:sp>
+    </p:spTree>
+    <p:extLst>
+      <p:ext uri="{BB962C8B-B14F-4D97-AF65-F5344CB8AC3E}">
+        <p14:creationId xmlns:p14="http://schemas.microsoft.com/office/powerpoint/2010/main" val="676275531"/>
+      </p:ext>
+    </p:extLst>
+  </p:cSld>
+  <p:clrMapOvr>
+    <a:masterClrMapping/>
+  </p:clrMapOvr>
   <p:timing>
     <p:tnLst>
       <p:par>
@@ -15027,11 +15393,7 @@
             <a:pPr lvl="1"/>
             <a:r>
               <a:rPr lang="en-US" sz="3600" dirty="0" smtClean="0"/>
-              <a:t>2017: AEA appoints Data Editor, with mandate to do similar </a:t>
-            </a:r>
-            <a:r>
-              <a:rPr lang="en-US" sz="3600" dirty="0" smtClean="0"/>
-              <a:t>activities </a:t>
+              <a:t>2017: AEA appoints Data Editor, with mandate to do similar activities </a:t>
             </a:r>
             <a:br>
               <a:rPr lang="en-US" sz="3600" dirty="0" smtClean="0"/>
@@ -17538,11 +17900,7 @@
           <a:p>
             <a:r>
               <a:rPr lang="en-US" dirty="0" smtClean="0"/>
-              <a:t>… the article itself </a:t>
-            </a:r>
-            <a:r>
-              <a:rPr lang="en-US" dirty="0" smtClean="0"/>
-              <a:t>(journal website) reveals </a:t>
+              <a:t>… the article itself (journal website) reveals </a:t>
             </a:r>
             <a:r>
               <a:rPr lang="en-US" b="1" u="sng" dirty="0" smtClean="0"/>
@@ -17688,11 +18046,11 @@
   <p:clrMapOvr>
     <a:masterClrMapping/>
   </p:clrMapOvr>
-  <mc:AlternateContent xmlns:mc="http://schemas.openxmlformats.org/markup-compatibility/2006">
-    <mc:Choice xmlns:p14="http://schemas.microsoft.com/office/powerpoint/2010/main" Requires="p14">
+  <mc:AlternateContent xmlns:mc="http://schemas.openxmlformats.org/markup-compatibility/2006" xmlns:p14="http://schemas.microsoft.com/office/powerpoint/2010/main">
+    <mc:Choice Requires="p14">
       <p:transition spd="slow" p14:dur="2000"/>
     </mc:Choice>
-    <mc:Fallback>
+    <mc:Fallback xmlns="">
       <p:transition spd="slow"/>
     </mc:Fallback>
   </mc:AlternateContent>
@@ -22839,7 +23197,6 @@
               <a:rPr lang="en-US" sz="2800" dirty="0" smtClean="0"/>
               <a:t>By better linking to paper-related resources </a:t>
             </a:r>
-            <a:endParaRPr lang="en-US" sz="2800" dirty="0" smtClean="0"/>
           </a:p>
           <a:p>
             <a:pPr lvl="2"/>
@@ -22854,7 +23211,6 @@
               <a:rPr lang="en-US" sz="2400" dirty="0" smtClean="0"/>
               <a:t>Restricted-access data</a:t>
             </a:r>
-            <a:endParaRPr lang="en-US" sz="2400" dirty="0" smtClean="0"/>
           </a:p>
           <a:p>
             <a:pPr lvl="2"/>
@@ -23098,22 +23454,14 @@
           <a:p>
             <a:r>
               <a:rPr lang="en-US" sz="3200" dirty="0" smtClean="0"/>
-              <a:t>Pre-emptively </a:t>
-            </a:r>
-            <a:r>
-              <a:rPr lang="en-US" sz="3200" dirty="0" smtClean="0"/>
-              <a:t>improve code archives</a:t>
+              <a:t>Pre-emptively improve code archives</a:t>
             </a:r>
           </a:p>
           <a:p>
             <a:pPr lvl="1"/>
             <a:r>
               <a:rPr lang="en-US" sz="2800" dirty="0" smtClean="0"/>
-              <a:t>By conducting reproducibility </a:t>
-            </a:r>
-            <a:r>
-              <a:rPr lang="en-US" sz="2800" dirty="0" smtClean="0"/>
-              <a:t>checks </a:t>
+              <a:t>By conducting reproducibility checks </a:t>
             </a:r>
             <a:r>
               <a:rPr lang="en-US" sz="2000" dirty="0" smtClean="0"/>
@@ -23125,11 +23473,7 @@
             <a:pPr lvl="1"/>
             <a:r>
               <a:rPr lang="en-US" sz="2800" dirty="0" smtClean="0"/>
-              <a:t>By working with groups that conduct reproducibility </a:t>
-            </a:r>
-            <a:r>
-              <a:rPr lang="en-US" sz="2800" dirty="0" smtClean="0"/>
-              <a:t>checks </a:t>
+              <a:t>By working with groups that conduct reproducibility checks </a:t>
             </a:r>
             <a:br>
               <a:rPr lang="en-US" sz="2800" dirty="0" smtClean="0"/>
@@ -23219,22 +23563,14 @@
           <a:p>
             <a:r>
               <a:rPr lang="en-US" sz="3200" dirty="0" smtClean="0"/>
-              <a:t>Better </a:t>
-            </a:r>
-            <a:r>
-              <a:rPr lang="en-US" sz="3200" dirty="0" smtClean="0"/>
-              <a:t>archives</a:t>
+              <a:t>Better archives</a:t>
             </a:r>
           </a:p>
           <a:p>
             <a:pPr lvl="1"/>
             <a:r>
               <a:rPr lang="en-US" sz="2800" dirty="0" smtClean="0"/>
-              <a:t>Greater transparency of the code and data </a:t>
-            </a:r>
-            <a:r>
-              <a:rPr lang="en-US" sz="2800" dirty="0" smtClean="0"/>
-              <a:t>archives</a:t>
+              <a:t>Greater transparency of the code and data archives</a:t>
             </a:r>
           </a:p>
           <a:p>
@@ -23264,7 +23600,6 @@
               <a:rPr lang="en-US" sz="2400" dirty="0" smtClean="0"/>
               <a:t>Display that information</a:t>
             </a:r>
-            <a:endParaRPr lang="en-US" sz="2400" dirty="0" smtClean="0"/>
           </a:p>
           <a:p>
             <a:endParaRPr lang="en-US" dirty="0"/>
@@ -23456,11 +23791,7 @@
           <a:p>
             <a:r>
               <a:rPr lang="en-US" dirty="0" smtClean="0"/>
-              <a:t>AEA “Data Availability Policy” (</a:t>
-            </a:r>
-            <a:r>
-              <a:rPr lang="en-US" dirty="0" smtClean="0"/>
-              <a:t>2018)</a:t>
+              <a:t>AEA “Data Availability Policy” (2018)</a:t>
             </a:r>
             <a:endParaRPr lang="en-US" dirty="0"/>
           </a:p>
@@ -24187,17 +24518,7 @@
                   </a:schemeClr>
                 </a:solidFill>
               </a:rPr>
-              <a:t>prior to </a:t>
-            </a:r>
-            <a:r>
-              <a:rPr lang="en-US" sz="3200" b="1" dirty="0" smtClean="0">
-                <a:solidFill>
-                  <a:schemeClr val="accent6">
-                    <a:lumMod val="75000"/>
-                  </a:schemeClr>
-                </a:solidFill>
-              </a:rPr>
-              <a:t>acceptance</a:t>
+              <a:t>prior to acceptance</a:t>
             </a:r>
             <a:r>
               <a:rPr lang="en-US" dirty="0" smtClean="0">
@@ -24590,17 +24911,7 @@
                   </a:schemeClr>
                 </a:solidFill>
               </a:rPr>
-              <a:t>prior to </a:t>
-            </a:r>
-            <a:r>
-              <a:rPr lang="en-US" sz="3200" b="1" dirty="0" smtClean="0">
-                <a:solidFill>
-                  <a:schemeClr val="accent6">
-                    <a:lumMod val="75000"/>
-                  </a:schemeClr>
-                </a:solidFill>
-              </a:rPr>
-              <a:t>acceptance</a:t>
+              <a:t>prior to acceptance</a:t>
             </a:r>
             <a:r>
               <a:rPr lang="en-US" dirty="0" smtClean="0">
@@ -24949,17 +25260,7 @@
                   </a:schemeClr>
                 </a:solidFill>
               </a:rPr>
-              <a:t>prior to </a:t>
-            </a:r>
-            <a:r>
-              <a:rPr lang="en-US" sz="3200" b="1" dirty="0" smtClean="0">
-                <a:solidFill>
-                  <a:schemeClr val="accent6">
-                    <a:lumMod val="75000"/>
-                  </a:schemeClr>
-                </a:solidFill>
-              </a:rPr>
-              <a:t>acceptance</a:t>
+              <a:t>prior to acceptance</a:t>
             </a:r>
             <a:r>
               <a:rPr lang="en-US" dirty="0" smtClean="0">
@@ -25348,17 +25649,7 @@
                   </a:schemeClr>
                 </a:solidFill>
               </a:rPr>
-              <a:t>prior to </a:t>
-            </a:r>
-            <a:r>
-              <a:rPr lang="en-US" sz="3200" b="1" dirty="0" smtClean="0">
-                <a:solidFill>
-                  <a:schemeClr val="accent6">
-                    <a:lumMod val="75000"/>
-                  </a:schemeClr>
-                </a:solidFill>
-              </a:rPr>
-              <a:t>acceptance</a:t>
+              <a:t>prior to acceptance</a:t>
             </a:r>
             <a:r>
               <a:rPr lang="en-US" dirty="0" smtClean="0">
@@ -29756,11 +30047,7 @@
           <a:p>
             <a:r>
               <a:rPr lang="en-US" dirty="0" smtClean="0"/>
-              <a:t>Work </a:t>
-            </a:r>
-            <a:r>
-              <a:rPr lang="en-US" dirty="0" smtClean="0"/>
-              <a:t>with Research Data Centers to facilitate transparency and reproducibility</a:t>
+              <a:t>Work with Research Data Centers to facilitate transparency and reproducibility</a:t>
             </a:r>
           </a:p>
           <a:p>
@@ -29774,11 +30061,7 @@
             <a:pPr lvl="1"/>
             <a:r>
               <a:rPr lang="en-US" dirty="0" smtClean="0"/>
-              <a:t>Standardize archives within RDCs + </a:t>
-            </a:r>
-            <a:r>
-              <a:rPr lang="en-US" dirty="0" smtClean="0"/>
-              <a:t>transparency</a:t>
+              <a:t>Standardize archives within RDCs + transparency</a:t>
             </a:r>
           </a:p>
           <a:p>
@@ -29787,7 +30070,6 @@
               <a:rPr lang="en-US" dirty="0" smtClean="0"/>
               <a:t>Develop guidelines and internal processes for preservation, reproducibility</a:t>
             </a:r>
-            <a:endParaRPr lang="en-US" dirty="0" smtClean="0"/>
           </a:p>
         </p:txBody>
       </p:sp>
@@ -30612,53 +30894,16 @@
           <a:p>
             <a:r>
               <a:rPr lang="en-US" dirty="0" smtClean="0"/>
-              <a:t>We!</a:t>
+              <a:t>Change ingrained habits…</a:t>
             </a:r>
             <a:endParaRPr lang="en-US" dirty="0"/>
-          </a:p>
-        </p:txBody>
-      </p:sp>
-      <p:sp>
-        <p:nvSpPr>
-          <p:cNvPr id="3" name="Content Placeholder 2"/>
-          <p:cNvSpPr>
-            <a:spLocks noGrp="1"/>
-          </p:cNvSpPr>
-          <p:nvPr>
-            <p:ph idx="1"/>
-          </p:nvPr>
-        </p:nvSpPr>
-        <p:spPr/>
-        <p:txBody>
-          <a:bodyPr>
-            <a:normAutofit/>
-          </a:bodyPr>
-          <a:lstStyle/>
-          <a:p>
-            <a:r>
-              <a:rPr lang="en-US" sz="5400" dirty="0" smtClean="0"/>
-              <a:t>Ingrained habits</a:t>
-            </a:r>
-          </a:p>
-          <a:p>
-            <a:r>
-              <a:rPr lang="en-US" sz="5400" dirty="0" smtClean="0"/>
-              <a:t>New skills to learn</a:t>
-            </a:r>
-          </a:p>
-          <a:p>
-            <a:r>
-              <a:rPr lang="en-US" sz="5400" dirty="0" smtClean="0"/>
-              <a:t>New methods to use</a:t>
-            </a:r>
-            <a:endParaRPr lang="en-US" sz="5400" dirty="0"/>
           </a:p>
         </p:txBody>
       </p:sp>
     </p:spTree>
     <p:extLst>
       <p:ext uri="{BB962C8B-B14F-4D97-AF65-F5344CB8AC3E}">
-        <p14:creationId xmlns:p14="http://schemas.microsoft.com/office/powerpoint/2010/main" val="4167916637"/>
+        <p14:creationId xmlns:p14="http://schemas.microsoft.com/office/powerpoint/2010/main" val="3864983236"/>
       </p:ext>
     </p:extLst>
   </p:cSld>
@@ -30694,7 +30939,7 @@
       </p:grpSpPr>
       <p:sp>
         <p:nvSpPr>
-          <p:cNvPr id="4" name="Title 3"/>
+          <p:cNvPr id="3" name="Title 2"/>
           <p:cNvSpPr>
             <a:spLocks noGrp="1"/>
           </p:cNvSpPr>
@@ -30707,161 +30952,46 @@
           <a:bodyPr/>
           <a:lstStyle/>
           <a:p>
-            <a:r>
-              <a:rPr lang="en-US" dirty="0" smtClean="0"/>
-              <a:t>Researchers: New skills to learn/teach</a:t>
-            </a:r>
-            <a:endParaRPr lang="en-US" dirty="0"/>
-          </a:p>
-        </p:txBody>
-      </p:sp>
-      <p:sp>
-        <p:nvSpPr>
+            <a:endParaRPr lang="en-US"/>
+          </a:p>
+        </p:txBody>
+      </p:sp>
+      <p:pic>
+        <p:nvPicPr>
           <p:cNvPr id="5" name="Content Placeholder 4"/>
-          <p:cNvSpPr>
-            <a:spLocks noGrp="1"/>
-          </p:cNvSpPr>
+          <p:cNvPicPr>
+            <a:picLocks noGrp="1" noChangeAspect="1"/>
+          </p:cNvPicPr>
           <p:nvPr>
             <p:ph idx="1"/>
           </p:nvPr>
-        </p:nvSpPr>
-        <p:spPr/>
-        <p:txBody>
-          <a:bodyPr>
-            <a:normAutofit/>
-          </a:bodyPr>
-          <a:lstStyle/>
-          <a:p>
-            <a:r>
-              <a:rPr lang="en-US" sz="3600" dirty="0" smtClean="0"/>
-              <a:t>How to </a:t>
-            </a:r>
-            <a:r>
-              <a:rPr lang="en-US" sz="4000" b="1" dirty="0" smtClean="0">
-                <a:solidFill>
-                  <a:schemeClr val="accent2">
-                    <a:lumMod val="75000"/>
-                  </a:schemeClr>
-                </a:solidFill>
-              </a:rPr>
-              <a:t>incorporate reproducible practices </a:t>
-            </a:r>
-            <a:r>
-              <a:rPr lang="en-US" sz="3600" dirty="0" smtClean="0"/>
-              <a:t>into your workflow</a:t>
-            </a:r>
-          </a:p>
-          <a:p>
-            <a:r>
-              <a:rPr lang="en-US" sz="3600" dirty="0"/>
-              <a:t>When to </a:t>
-            </a:r>
-            <a:r>
-              <a:rPr lang="en-US" sz="4000" b="1" dirty="0">
-                <a:solidFill>
-                  <a:schemeClr val="accent6">
-                    <a:lumMod val="75000"/>
-                  </a:schemeClr>
-                </a:solidFill>
-              </a:rPr>
-              <a:t>pre-register</a:t>
-            </a:r>
-            <a:r>
-              <a:rPr lang="en-US" sz="3600" dirty="0"/>
-              <a:t>, and when not to</a:t>
-            </a:r>
-          </a:p>
-          <a:p>
-            <a:r>
-              <a:rPr lang="en-US" sz="4000" b="1" dirty="0">
-                <a:solidFill>
-                  <a:schemeClr val="accent5">
-                    <a:lumMod val="75000"/>
-                  </a:schemeClr>
-                </a:solidFill>
-              </a:rPr>
-              <a:t>Document</a:t>
-            </a:r>
-            <a:r>
-              <a:rPr lang="en-US" sz="3600" dirty="0"/>
-              <a:t> early, and </a:t>
-            </a:r>
-            <a:r>
-              <a:rPr lang="en-US" sz="3600" dirty="0" smtClean="0"/>
-              <a:t>often (better READMEs!)</a:t>
-            </a:r>
-            <a:endParaRPr lang="en-US" sz="3600" dirty="0"/>
-          </a:p>
-          <a:p>
-            <a:r>
-              <a:rPr lang="en-US" sz="3600" dirty="0" smtClean="0"/>
-              <a:t>How, where, and when to </a:t>
-            </a:r>
-            <a:r>
-              <a:rPr lang="en-US" sz="4400" b="1" dirty="0" smtClean="0">
-                <a:solidFill>
-                  <a:schemeClr val="accent2">
-                    <a:lumMod val="75000"/>
-                  </a:schemeClr>
-                </a:solidFill>
-              </a:rPr>
-              <a:t>archive data and code</a:t>
-            </a:r>
-            <a:endParaRPr lang="en-US" sz="3600" b="1" dirty="0" smtClean="0">
-              <a:solidFill>
-                <a:schemeClr val="accent2">
-                  <a:lumMod val="75000"/>
-                </a:schemeClr>
-              </a:solidFill>
-            </a:endParaRPr>
-          </a:p>
-          <a:p>
-            <a:r>
-              <a:rPr lang="en-US" sz="3600" dirty="0" smtClean="0"/>
-              <a:t>How to </a:t>
-            </a:r>
-            <a:r>
-              <a:rPr lang="en-US" sz="4000" b="1" dirty="0" smtClean="0">
-                <a:solidFill>
-                  <a:schemeClr val="accent6">
-                    <a:lumMod val="75000"/>
-                  </a:schemeClr>
-                </a:solidFill>
-              </a:rPr>
-              <a:t>license</a:t>
-            </a:r>
-            <a:r>
-              <a:rPr lang="en-US" sz="3600" dirty="0" smtClean="0"/>
-              <a:t> your contributions!</a:t>
-            </a:r>
-          </a:p>
-        </p:txBody>
-      </p:sp>
+        </p:nvPicPr>
+        <p:blipFill>
+          <a:blip r:embed="rId2"/>
+          <a:stretch>
+            <a:fillRect/>
+          </a:stretch>
+        </p:blipFill>
+        <p:spPr>
+          <a:xfrm>
+            <a:off x="4241800" y="532715"/>
+            <a:ext cx="6313593" cy="6037948"/>
+          </a:xfrm>
+          <a:prstGeom prst="rect">
+            <a:avLst/>
+          </a:prstGeom>
+        </p:spPr>
+      </p:pic>
     </p:spTree>
     <p:extLst>
       <p:ext uri="{BB962C8B-B14F-4D97-AF65-F5344CB8AC3E}">
-        <p14:creationId xmlns:p14="http://schemas.microsoft.com/office/powerpoint/2010/main" val="2490240518"/>
+        <p14:creationId xmlns:p14="http://schemas.microsoft.com/office/powerpoint/2010/main" val="910124782"/>
       </p:ext>
     </p:extLst>
   </p:cSld>
   <p:clrMapOvr>
     <a:masterClrMapping/>
   </p:clrMapOvr>
-  <mc:AlternateContent xmlns:mc="http://schemas.openxmlformats.org/markup-compatibility/2006" xmlns:p14="http://schemas.microsoft.com/office/powerpoint/2010/main">
-    <mc:Choice Requires="p14">
-      <p:transition spd="slow" p14:dur="2000"/>
-    </mc:Choice>
-    <mc:Fallback xmlns="">
-      <p:transition spd="slow"/>
-    </mc:Fallback>
-  </mc:AlternateContent>
-  <p:timing>
-    <p:tnLst>
-      <p:par>
-        <p:cTn id="1" dur="indefinite" restart="never" nodeType="tmRoot"/>
-      </p:par>
-    </p:tnLst>
-  </p:timing>
 </p:sld>
 </file>
 
@@ -31601,6 +31731,1252 @@
       </p:grpSpPr>
       <p:sp>
         <p:nvSpPr>
+          <p:cNvPr id="2" name="Title 1"/>
+          <p:cNvSpPr>
+            <a:spLocks noGrp="1"/>
+          </p:cNvSpPr>
+          <p:nvPr>
+            <p:ph type="title"/>
+          </p:nvPr>
+        </p:nvSpPr>
+        <p:spPr/>
+        <p:txBody>
+          <a:bodyPr/>
+          <a:lstStyle/>
+          <a:p>
+            <a:r>
+              <a:rPr lang="en-US" dirty="0" smtClean="0"/>
+              <a:t>New skills to learn…</a:t>
+            </a:r>
+            <a:endParaRPr lang="en-US" dirty="0"/>
+          </a:p>
+        </p:txBody>
+      </p:sp>
+    </p:spTree>
+    <p:extLst>
+      <p:ext uri="{BB962C8B-B14F-4D97-AF65-F5344CB8AC3E}">
+        <p14:creationId xmlns:p14="http://schemas.microsoft.com/office/powerpoint/2010/main" val="4144276306"/>
+      </p:ext>
+    </p:extLst>
+  </p:cSld>
+  <p:clrMapOvr>
+    <a:masterClrMapping/>
+  </p:clrMapOvr>
+  <p:timing>
+    <p:tnLst>
+      <p:par>
+        <p:cTn id="1" dur="indefinite" restart="never" nodeType="tmRoot"/>
+      </p:par>
+    </p:tnLst>
+  </p:timing>
+</p:sld>
+</file>
+
+<file path=ppt/slides/slide91.xml><?xml version="1.0" encoding="utf-8"?>
+<p:sld xmlns:a="http://schemas.openxmlformats.org/drawingml/2006/main" xmlns:r="http://schemas.openxmlformats.org/officeDocument/2006/relationships" xmlns:p="http://schemas.openxmlformats.org/presentationml/2006/main">
+  <p:cSld>
+    <p:spTree>
+      <p:nvGrpSpPr>
+        <p:cNvPr id="1" name=""/>
+        <p:cNvGrpSpPr/>
+        <p:nvPr/>
+      </p:nvGrpSpPr>
+      <p:grpSpPr>
+        <a:xfrm>
+          <a:off x="0" y="0"/>
+          <a:ext cx="0" cy="0"/>
+          <a:chOff x="0" y="0"/>
+          <a:chExt cx="0" cy="0"/>
+        </a:xfrm>
+      </p:grpSpPr>
+      <p:sp>
+        <p:nvSpPr>
+          <p:cNvPr id="3" name="Title 2"/>
+          <p:cNvSpPr>
+            <a:spLocks noGrp="1"/>
+          </p:cNvSpPr>
+          <p:nvPr>
+            <p:ph type="title"/>
+          </p:nvPr>
+        </p:nvSpPr>
+        <p:spPr/>
+        <p:txBody>
+          <a:bodyPr/>
+          <a:lstStyle/>
+          <a:p>
+            <a:endParaRPr lang="en-US"/>
+          </a:p>
+        </p:txBody>
+      </p:sp>
+      <p:sp>
+        <p:nvSpPr>
+          <p:cNvPr id="4" name="Content Placeholder 3"/>
+          <p:cNvSpPr>
+            <a:spLocks noGrp="1"/>
+          </p:cNvSpPr>
+          <p:nvPr>
+            <p:ph idx="1"/>
+          </p:nvPr>
+        </p:nvSpPr>
+        <p:spPr/>
+        <p:txBody>
+          <a:bodyPr/>
+          <a:lstStyle/>
+          <a:p>
+            <a:endParaRPr lang="en-US"/>
+          </a:p>
+        </p:txBody>
+      </p:sp>
+      <p:pic>
+        <p:nvPicPr>
+          <p:cNvPr id="5" name="Picture 4"/>
+          <p:cNvPicPr>
+            <a:picLocks noChangeAspect="1"/>
+          </p:cNvPicPr>
+          <p:nvPr/>
+        </p:nvPicPr>
+        <p:blipFill>
+          <a:blip r:embed="rId2"/>
+          <a:stretch>
+            <a:fillRect/>
+          </a:stretch>
+        </p:blipFill>
+        <p:spPr>
+          <a:xfrm>
+            <a:off x="7394040" y="3249613"/>
+            <a:ext cx="3959760" cy="3062287"/>
+          </a:xfrm>
+          <a:prstGeom prst="rect">
+            <a:avLst/>
+          </a:prstGeom>
+          <a:ln w="38100">
+            <a:solidFill>
+              <a:schemeClr val="accent1"/>
+            </a:solidFill>
+          </a:ln>
+          <a:effectLst>
+            <a:outerShdw blurRad="50800" dist="127000" dir="2700000" algn="tl" rotWithShape="0">
+              <a:prstClr val="black">
+                <a:alpha val="40000"/>
+              </a:prstClr>
+            </a:outerShdw>
+          </a:effectLst>
+        </p:spPr>
+      </p:pic>
+      <p:pic>
+        <p:nvPicPr>
+          <p:cNvPr id="6" name="Picture 5"/>
+          <p:cNvPicPr>
+            <a:picLocks noChangeAspect="1"/>
+          </p:cNvPicPr>
+          <p:nvPr/>
+        </p:nvPicPr>
+        <p:blipFill>
+          <a:blip r:embed="rId3"/>
+          <a:stretch>
+            <a:fillRect/>
+          </a:stretch>
+        </p:blipFill>
+        <p:spPr>
+          <a:xfrm>
+            <a:off x="2010301" y="4361260"/>
+            <a:ext cx="4567238" cy="1950640"/>
+          </a:xfrm>
+          <a:prstGeom prst="rect">
+            <a:avLst/>
+          </a:prstGeom>
+          <a:ln w="28575">
+            <a:solidFill>
+              <a:schemeClr val="accent1"/>
+            </a:solidFill>
+          </a:ln>
+          <a:effectLst>
+            <a:outerShdw blurRad="50800" dist="127000" dir="2700000" algn="tl" rotWithShape="0">
+              <a:prstClr val="black">
+                <a:alpha val="40000"/>
+              </a:prstClr>
+            </a:outerShdw>
+          </a:effectLst>
+        </p:spPr>
+      </p:pic>
+      <p:pic>
+        <p:nvPicPr>
+          <p:cNvPr id="7" name="Picture 6"/>
+          <p:cNvPicPr>
+            <a:picLocks noChangeAspect="1"/>
+          </p:cNvPicPr>
+          <p:nvPr/>
+        </p:nvPicPr>
+        <p:blipFill>
+          <a:blip r:embed="rId4"/>
+          <a:stretch>
+            <a:fillRect/>
+          </a:stretch>
+        </p:blipFill>
+        <p:spPr>
+          <a:xfrm>
+            <a:off x="639763" y="1937147"/>
+            <a:ext cx="3974154" cy="2624931"/>
+          </a:xfrm>
+          <a:prstGeom prst="rect">
+            <a:avLst/>
+          </a:prstGeom>
+          <a:effectLst>
+            <a:outerShdw blurRad="50800" dist="127000" dir="2700000" algn="tl" rotWithShape="0">
+              <a:prstClr val="black">
+                <a:alpha val="40000"/>
+              </a:prstClr>
+            </a:outerShdw>
+          </a:effectLst>
+        </p:spPr>
+      </p:pic>
+      <p:pic>
+        <p:nvPicPr>
+          <p:cNvPr id="8" name="Picture 7"/>
+          <p:cNvPicPr>
+            <a:picLocks noChangeAspect="1"/>
+          </p:cNvPicPr>
+          <p:nvPr/>
+        </p:nvPicPr>
+        <p:blipFill>
+          <a:blip r:embed="rId5"/>
+          <a:stretch>
+            <a:fillRect/>
+          </a:stretch>
+        </p:blipFill>
+        <p:spPr>
+          <a:xfrm>
+            <a:off x="4119563" y="1028699"/>
+            <a:ext cx="4496487" cy="2768601"/>
+          </a:xfrm>
+          <a:prstGeom prst="rect">
+            <a:avLst/>
+          </a:prstGeom>
+          <a:ln w="38100">
+            <a:solidFill>
+              <a:schemeClr val="accent1"/>
+            </a:solidFill>
+          </a:ln>
+          <a:effectLst>
+            <a:outerShdw blurRad="50800" dist="127000" dir="2700000" algn="tl" rotWithShape="0">
+              <a:prstClr val="black">
+                <a:alpha val="40000"/>
+              </a:prstClr>
+            </a:outerShdw>
+          </a:effectLst>
+        </p:spPr>
+      </p:pic>
+      <p:pic>
+        <p:nvPicPr>
+          <p:cNvPr id="9" name="Picture 8"/>
+          <p:cNvPicPr>
+            <a:picLocks noChangeAspect="1"/>
+          </p:cNvPicPr>
+          <p:nvPr/>
+        </p:nvPicPr>
+        <p:blipFill>
+          <a:blip r:embed="rId6"/>
+          <a:stretch>
+            <a:fillRect/>
+          </a:stretch>
+        </p:blipFill>
+        <p:spPr>
+          <a:xfrm>
+            <a:off x="6204049" y="1674813"/>
+            <a:ext cx="5095350" cy="2879725"/>
+          </a:xfrm>
+          <a:prstGeom prst="rect">
+            <a:avLst/>
+          </a:prstGeom>
+          <a:effectLst>
+            <a:outerShdw blurRad="50800" dist="254000" dir="2700000" algn="tl" rotWithShape="0">
+              <a:prstClr val="black">
+                <a:alpha val="40000"/>
+              </a:prstClr>
+            </a:outerShdw>
+          </a:effectLst>
+        </p:spPr>
+      </p:pic>
+      <p:pic>
+        <p:nvPicPr>
+          <p:cNvPr id="10" name="Picture 9"/>
+          <p:cNvPicPr>
+            <a:picLocks noChangeAspect="1"/>
+          </p:cNvPicPr>
+          <p:nvPr/>
+        </p:nvPicPr>
+        <p:blipFill>
+          <a:blip r:embed="rId7"/>
+          <a:stretch>
+            <a:fillRect/>
+          </a:stretch>
+        </p:blipFill>
+        <p:spPr>
+          <a:xfrm>
+            <a:off x="3267191" y="2459336"/>
+            <a:ext cx="4628089" cy="2523397"/>
+          </a:xfrm>
+          <a:prstGeom prst="rect">
+            <a:avLst/>
+          </a:prstGeom>
+          <a:effectLst>
+            <a:outerShdw blurRad="50800" dist="127000" dir="2700000" algn="tl" rotWithShape="0">
+              <a:prstClr val="black">
+                <a:alpha val="40000"/>
+              </a:prstClr>
+            </a:outerShdw>
+          </a:effectLst>
+        </p:spPr>
+      </p:pic>
+    </p:spTree>
+    <p:extLst>
+      <p:ext uri="{BB962C8B-B14F-4D97-AF65-F5344CB8AC3E}">
+        <p14:creationId xmlns:p14="http://schemas.microsoft.com/office/powerpoint/2010/main" val="2814942460"/>
+      </p:ext>
+    </p:extLst>
+  </p:cSld>
+  <p:clrMapOvr>
+    <a:masterClrMapping/>
+  </p:clrMapOvr>
+  <p:timing>
+    <p:tnLst>
+      <p:par>
+        <p:cTn id="1" dur="indefinite" restart="never" nodeType="tmRoot">
+          <p:childTnLst>
+            <p:seq concurrent="1" nextAc="seek">
+              <p:cTn id="2" dur="indefinite" nodeType="mainSeq">
+                <p:childTnLst>
+                  <p:par>
+                    <p:cTn id="3" fill="hold">
+                      <p:stCondLst>
+                        <p:cond delay="indefinite"/>
+                        <p:cond evt="onBegin" delay="0">
+                          <p:tn val="2"/>
+                        </p:cond>
+                      </p:stCondLst>
+                      <p:childTnLst>
+                        <p:par>
+                          <p:cTn id="4" fill="hold">
+                            <p:stCondLst>
+                              <p:cond delay="0"/>
+                            </p:stCondLst>
+                            <p:childTnLst>
+                              <p:par>
+                                <p:cTn id="5" presetID="1" presetClass="entr" presetSubtype="0" fill="hold" grpId="0" nodeType="afterEffect" nodePh="1">
+                                  <p:stCondLst>
+                                    <p:cond delay="250"/>
+                                  </p:stCondLst>
+                                  <p:endCondLst>
+                                    <p:cond evt="begin" delay="0">
+                                      <p:tn val="5"/>
+                                    </p:cond>
+                                  </p:endCondLst>
+                                  <p:childTnLst>
+                                    <p:set>
+                                      <p:cBhvr>
+                                        <p:cTn id="6" dur="1" fill="hold">
+                                          <p:stCondLst>
+                                            <p:cond delay="0"/>
+                                          </p:stCondLst>
+                                        </p:cTn>
+                                        <p:tgtEl>
+                                          <p:spTgt spid="4">
+                                            <p:txEl>
+                                              <p:pRg st="0" end="0"/>
+                                            </p:txEl>
+                                          </p:spTgt>
+                                        </p:tgtEl>
+                                        <p:attrNameLst>
+                                          <p:attrName>style.visibility</p:attrName>
+                                        </p:attrNameLst>
+                                      </p:cBhvr>
+                                      <p:to>
+                                        <p:strVal val="visible"/>
+                                      </p:to>
+                                    </p:set>
+                                  </p:childTnLst>
+                                </p:cTn>
+                              </p:par>
+                            </p:childTnLst>
+                          </p:cTn>
+                        </p:par>
+                        <p:par>
+                          <p:cTn id="7" fill="hold">
+                            <p:stCondLst>
+                              <p:cond delay="250"/>
+                            </p:stCondLst>
+                            <p:childTnLst>
+                              <p:par>
+                                <p:cTn id="8" presetID="1" presetClass="entr" presetSubtype="0" fill="hold" nodeType="afterEffect">
+                                  <p:stCondLst>
+                                    <p:cond delay="250"/>
+                                  </p:stCondLst>
+                                  <p:childTnLst>
+                                    <p:set>
+                                      <p:cBhvr>
+                                        <p:cTn id="9" dur="1" fill="hold">
+                                          <p:stCondLst>
+                                            <p:cond delay="0"/>
+                                          </p:stCondLst>
+                                        </p:cTn>
+                                        <p:tgtEl>
+                                          <p:spTgt spid="5"/>
+                                        </p:tgtEl>
+                                        <p:attrNameLst>
+                                          <p:attrName>style.visibility</p:attrName>
+                                        </p:attrNameLst>
+                                      </p:cBhvr>
+                                      <p:to>
+                                        <p:strVal val="visible"/>
+                                      </p:to>
+                                    </p:set>
+                                  </p:childTnLst>
+                                </p:cTn>
+                              </p:par>
+                            </p:childTnLst>
+                          </p:cTn>
+                        </p:par>
+                        <p:par>
+                          <p:cTn id="10" fill="hold">
+                            <p:stCondLst>
+                              <p:cond delay="500"/>
+                            </p:stCondLst>
+                            <p:childTnLst>
+                              <p:par>
+                                <p:cTn id="11" presetID="1" presetClass="entr" presetSubtype="0" fill="hold" nodeType="afterEffect">
+                                  <p:stCondLst>
+                                    <p:cond delay="250"/>
+                                  </p:stCondLst>
+                                  <p:childTnLst>
+                                    <p:set>
+                                      <p:cBhvr>
+                                        <p:cTn id="12" dur="1" fill="hold">
+                                          <p:stCondLst>
+                                            <p:cond delay="0"/>
+                                          </p:stCondLst>
+                                        </p:cTn>
+                                        <p:tgtEl>
+                                          <p:spTgt spid="6"/>
+                                        </p:tgtEl>
+                                        <p:attrNameLst>
+                                          <p:attrName>style.visibility</p:attrName>
+                                        </p:attrNameLst>
+                                      </p:cBhvr>
+                                      <p:to>
+                                        <p:strVal val="visible"/>
+                                      </p:to>
+                                    </p:set>
+                                  </p:childTnLst>
+                                </p:cTn>
+                              </p:par>
+                            </p:childTnLst>
+                          </p:cTn>
+                        </p:par>
+                        <p:par>
+                          <p:cTn id="13" fill="hold">
+                            <p:stCondLst>
+                              <p:cond delay="750"/>
+                            </p:stCondLst>
+                            <p:childTnLst>
+                              <p:par>
+                                <p:cTn id="14" presetID="1" presetClass="entr" presetSubtype="0" fill="hold" nodeType="afterEffect">
+                                  <p:stCondLst>
+                                    <p:cond delay="250"/>
+                                  </p:stCondLst>
+                                  <p:childTnLst>
+                                    <p:set>
+                                      <p:cBhvr>
+                                        <p:cTn id="15" dur="1" fill="hold">
+                                          <p:stCondLst>
+                                            <p:cond delay="0"/>
+                                          </p:stCondLst>
+                                        </p:cTn>
+                                        <p:tgtEl>
+                                          <p:spTgt spid="7"/>
+                                        </p:tgtEl>
+                                        <p:attrNameLst>
+                                          <p:attrName>style.visibility</p:attrName>
+                                        </p:attrNameLst>
+                                      </p:cBhvr>
+                                      <p:to>
+                                        <p:strVal val="visible"/>
+                                      </p:to>
+                                    </p:set>
+                                  </p:childTnLst>
+                                </p:cTn>
+                              </p:par>
+                            </p:childTnLst>
+                          </p:cTn>
+                        </p:par>
+                        <p:par>
+                          <p:cTn id="16" fill="hold">
+                            <p:stCondLst>
+                              <p:cond delay="1000"/>
+                            </p:stCondLst>
+                            <p:childTnLst>
+                              <p:par>
+                                <p:cTn id="17" presetID="1" presetClass="entr" presetSubtype="0" fill="hold" nodeType="afterEffect">
+                                  <p:stCondLst>
+                                    <p:cond delay="250"/>
+                                  </p:stCondLst>
+                                  <p:childTnLst>
+                                    <p:set>
+                                      <p:cBhvr>
+                                        <p:cTn id="18" dur="1" fill="hold">
+                                          <p:stCondLst>
+                                            <p:cond delay="0"/>
+                                          </p:stCondLst>
+                                        </p:cTn>
+                                        <p:tgtEl>
+                                          <p:spTgt spid="8"/>
+                                        </p:tgtEl>
+                                        <p:attrNameLst>
+                                          <p:attrName>style.visibility</p:attrName>
+                                        </p:attrNameLst>
+                                      </p:cBhvr>
+                                      <p:to>
+                                        <p:strVal val="visible"/>
+                                      </p:to>
+                                    </p:set>
+                                  </p:childTnLst>
+                                </p:cTn>
+                              </p:par>
+                            </p:childTnLst>
+                          </p:cTn>
+                        </p:par>
+                        <p:par>
+                          <p:cTn id="19" fill="hold">
+                            <p:stCondLst>
+                              <p:cond delay="1250"/>
+                            </p:stCondLst>
+                            <p:childTnLst>
+                              <p:par>
+                                <p:cTn id="20" presetID="1" presetClass="entr" presetSubtype="0" fill="hold" nodeType="afterEffect">
+                                  <p:stCondLst>
+                                    <p:cond delay="250"/>
+                                  </p:stCondLst>
+                                  <p:childTnLst>
+                                    <p:set>
+                                      <p:cBhvr>
+                                        <p:cTn id="21" dur="1" fill="hold">
+                                          <p:stCondLst>
+                                            <p:cond delay="0"/>
+                                          </p:stCondLst>
+                                        </p:cTn>
+                                        <p:tgtEl>
+                                          <p:spTgt spid="9"/>
+                                        </p:tgtEl>
+                                        <p:attrNameLst>
+                                          <p:attrName>style.visibility</p:attrName>
+                                        </p:attrNameLst>
+                                      </p:cBhvr>
+                                      <p:to>
+                                        <p:strVal val="visible"/>
+                                      </p:to>
+                                    </p:set>
+                                  </p:childTnLst>
+                                </p:cTn>
+                              </p:par>
+                            </p:childTnLst>
+                          </p:cTn>
+                        </p:par>
+                        <p:par>
+                          <p:cTn id="22" fill="hold">
+                            <p:stCondLst>
+                              <p:cond delay="1500"/>
+                            </p:stCondLst>
+                            <p:childTnLst>
+                              <p:par>
+                                <p:cTn id="23" presetID="1" presetClass="entr" presetSubtype="0" fill="hold" nodeType="afterEffect">
+                                  <p:stCondLst>
+                                    <p:cond delay="250"/>
+                                  </p:stCondLst>
+                                  <p:childTnLst>
+                                    <p:set>
+                                      <p:cBhvr>
+                                        <p:cTn id="24" dur="1" fill="hold">
+                                          <p:stCondLst>
+                                            <p:cond delay="0"/>
+                                          </p:stCondLst>
+                                        </p:cTn>
+                                        <p:tgtEl>
+                                          <p:spTgt spid="10"/>
+                                        </p:tgtEl>
+                                        <p:attrNameLst>
+                                          <p:attrName>style.visibility</p:attrName>
+                                        </p:attrNameLst>
+                                      </p:cBhvr>
+                                      <p:to>
+                                        <p:strVal val="visible"/>
+                                      </p:to>
+                                    </p:set>
+                                  </p:childTnLst>
+                                </p:cTn>
+                              </p:par>
+                            </p:childTnLst>
+                          </p:cTn>
+                        </p:par>
+                      </p:childTnLst>
+                    </p:cTn>
+                  </p:par>
+                </p:childTnLst>
+              </p:cTn>
+              <p:prevCondLst>
+                <p:cond evt="onPrev" delay="0">
+                  <p:tgtEl>
+                    <p:sldTgt/>
+                  </p:tgtEl>
+                </p:cond>
+              </p:prevCondLst>
+              <p:nextCondLst>
+                <p:cond evt="onNext" delay="0">
+                  <p:tgtEl>
+                    <p:sldTgt/>
+                  </p:tgtEl>
+                </p:cond>
+              </p:nextCondLst>
+            </p:seq>
+          </p:childTnLst>
+        </p:cTn>
+      </p:par>
+    </p:tnLst>
+    <p:bldLst>
+      <p:bldP spid="4" grpId="0" build="p"/>
+    </p:bldLst>
+  </p:timing>
+</p:sld>
+</file>
+
+<file path=ppt/slides/slide92.xml><?xml version="1.0" encoding="utf-8"?>
+<p:sld xmlns:a="http://schemas.openxmlformats.org/drawingml/2006/main" xmlns:r="http://schemas.openxmlformats.org/officeDocument/2006/relationships" xmlns:p="http://schemas.openxmlformats.org/presentationml/2006/main">
+  <p:cSld>
+    <p:spTree>
+      <p:nvGrpSpPr>
+        <p:cNvPr id="1" name=""/>
+        <p:cNvGrpSpPr/>
+        <p:nvPr/>
+      </p:nvGrpSpPr>
+      <p:grpSpPr>
+        <a:xfrm>
+          <a:off x="0" y="0"/>
+          <a:ext cx="0" cy="0"/>
+          <a:chOff x="0" y="0"/>
+          <a:chExt cx="0" cy="0"/>
+        </a:xfrm>
+      </p:grpSpPr>
+      <p:sp>
+        <p:nvSpPr>
+          <p:cNvPr id="2" name="Title 1"/>
+          <p:cNvSpPr>
+            <a:spLocks noGrp="1"/>
+          </p:cNvSpPr>
+          <p:nvPr>
+            <p:ph type="title"/>
+          </p:nvPr>
+        </p:nvSpPr>
+        <p:spPr/>
+        <p:txBody>
+          <a:bodyPr/>
+          <a:lstStyle/>
+          <a:p>
+            <a:r>
+              <a:rPr lang="en-US" dirty="0" smtClean="0"/>
+              <a:t>New methods to use …</a:t>
+            </a:r>
+            <a:endParaRPr lang="en-US" dirty="0"/>
+          </a:p>
+        </p:txBody>
+      </p:sp>
+    </p:spTree>
+    <p:extLst>
+      <p:ext uri="{BB962C8B-B14F-4D97-AF65-F5344CB8AC3E}">
+        <p14:creationId xmlns:p14="http://schemas.microsoft.com/office/powerpoint/2010/main" val="222803612"/>
+      </p:ext>
+    </p:extLst>
+  </p:cSld>
+  <p:clrMapOvr>
+    <a:masterClrMapping/>
+  </p:clrMapOvr>
+  <p:timing>
+    <p:tnLst>
+      <p:par>
+        <p:cTn id="1" dur="indefinite" restart="never" nodeType="tmRoot"/>
+      </p:par>
+    </p:tnLst>
+  </p:timing>
+</p:sld>
+</file>
+
+<file path=ppt/slides/slide93.xml><?xml version="1.0" encoding="utf-8"?>
+<p:sld xmlns:a="http://schemas.openxmlformats.org/drawingml/2006/main" xmlns:r="http://schemas.openxmlformats.org/officeDocument/2006/relationships" xmlns:p="http://schemas.openxmlformats.org/presentationml/2006/main">
+  <p:cSld>
+    <p:spTree>
+      <p:nvGrpSpPr>
+        <p:cNvPr id="1" name=""/>
+        <p:cNvGrpSpPr/>
+        <p:nvPr/>
+      </p:nvGrpSpPr>
+      <p:grpSpPr>
+        <a:xfrm>
+          <a:off x="0" y="0"/>
+          <a:ext cx="0" cy="0"/>
+          <a:chOff x="0" y="0"/>
+          <a:chExt cx="0" cy="0"/>
+        </a:xfrm>
+      </p:grpSpPr>
+      <p:sp>
+        <p:nvSpPr>
+          <p:cNvPr id="3" name="Title 2"/>
+          <p:cNvSpPr>
+            <a:spLocks noGrp="1"/>
+          </p:cNvSpPr>
+          <p:nvPr>
+            <p:ph type="title"/>
+          </p:nvPr>
+        </p:nvSpPr>
+        <p:spPr/>
+        <p:txBody>
+          <a:bodyPr/>
+          <a:lstStyle/>
+          <a:p>
+            <a:endParaRPr lang="en-US"/>
+          </a:p>
+        </p:txBody>
+      </p:sp>
+      <p:pic>
+        <p:nvPicPr>
+          <p:cNvPr id="5" name="Content Placeholder 4"/>
+          <p:cNvPicPr>
+            <a:picLocks noGrp="1" noChangeAspect="1"/>
+          </p:cNvPicPr>
+          <p:nvPr>
+            <p:ph idx="1"/>
+          </p:nvPr>
+        </p:nvPicPr>
+        <p:blipFill>
+          <a:blip r:embed="rId2"/>
+          <a:stretch>
+            <a:fillRect/>
+          </a:stretch>
+        </p:blipFill>
+        <p:spPr>
+          <a:xfrm>
+            <a:off x="7044006" y="1177635"/>
+            <a:ext cx="4584695" cy="3489181"/>
+          </a:xfrm>
+          <a:prstGeom prst="rect">
+            <a:avLst/>
+          </a:prstGeom>
+        </p:spPr>
+      </p:pic>
+      <p:pic>
+        <p:nvPicPr>
+          <p:cNvPr id="6" name="Picture 5"/>
+          <p:cNvPicPr>
+            <a:picLocks noChangeAspect="1"/>
+          </p:cNvPicPr>
+          <p:nvPr/>
+        </p:nvPicPr>
+        <p:blipFill>
+          <a:blip r:embed="rId3"/>
+          <a:stretch>
+            <a:fillRect/>
+          </a:stretch>
+        </p:blipFill>
+        <p:spPr>
+          <a:xfrm>
+            <a:off x="4901478" y="2922745"/>
+            <a:ext cx="4824413" cy="3047698"/>
+          </a:xfrm>
+          <a:prstGeom prst="rect">
+            <a:avLst/>
+          </a:prstGeom>
+        </p:spPr>
+      </p:pic>
+      <p:pic>
+        <p:nvPicPr>
+          <p:cNvPr id="7" name="Picture 6"/>
+          <p:cNvPicPr>
+            <a:picLocks noChangeAspect="1"/>
+          </p:cNvPicPr>
+          <p:nvPr/>
+        </p:nvPicPr>
+        <p:blipFill>
+          <a:blip r:embed="rId4"/>
+          <a:stretch>
+            <a:fillRect/>
+          </a:stretch>
+        </p:blipFill>
+        <p:spPr>
+          <a:xfrm>
+            <a:off x="564573" y="1906299"/>
+            <a:ext cx="6324600" cy="3876675"/>
+          </a:xfrm>
+          <a:prstGeom prst="rect">
+            <a:avLst/>
+          </a:prstGeom>
+        </p:spPr>
+      </p:pic>
+      <p:pic>
+        <p:nvPicPr>
+          <p:cNvPr id="8" name="Picture 7"/>
+          <p:cNvPicPr>
+            <a:picLocks noChangeAspect="1"/>
+          </p:cNvPicPr>
+          <p:nvPr/>
+        </p:nvPicPr>
+        <p:blipFill>
+          <a:blip r:embed="rId5"/>
+          <a:stretch>
+            <a:fillRect/>
+          </a:stretch>
+        </p:blipFill>
+        <p:spPr>
+          <a:xfrm>
+            <a:off x="2338387" y="2100262"/>
+            <a:ext cx="7515225" cy="2657475"/>
+          </a:xfrm>
+          <a:prstGeom prst="rect">
+            <a:avLst/>
+          </a:prstGeom>
+        </p:spPr>
+      </p:pic>
+      <p:pic>
+        <p:nvPicPr>
+          <p:cNvPr id="9" name="Picture 8"/>
+          <p:cNvPicPr>
+            <a:picLocks noChangeAspect="1"/>
+          </p:cNvPicPr>
+          <p:nvPr/>
+        </p:nvPicPr>
+        <p:blipFill>
+          <a:blip r:embed="rId6"/>
+          <a:stretch>
+            <a:fillRect/>
+          </a:stretch>
+        </p:blipFill>
+        <p:spPr>
+          <a:xfrm>
+            <a:off x="375754" y="856686"/>
+            <a:ext cx="6825121" cy="3983614"/>
+          </a:xfrm>
+          <a:prstGeom prst="rect">
+            <a:avLst/>
+          </a:prstGeom>
+        </p:spPr>
+      </p:pic>
+      <p:pic>
+        <p:nvPicPr>
+          <p:cNvPr id="10" name="Picture 9"/>
+          <p:cNvPicPr>
+            <a:picLocks noChangeAspect="1"/>
+          </p:cNvPicPr>
+          <p:nvPr/>
+        </p:nvPicPr>
+        <p:blipFill>
+          <a:blip r:embed="rId7"/>
+          <a:stretch>
+            <a:fillRect/>
+          </a:stretch>
+        </p:blipFill>
+        <p:spPr>
+          <a:xfrm>
+            <a:off x="1743075" y="1385887"/>
+            <a:ext cx="8705850" cy="4086225"/>
+          </a:xfrm>
+          <a:prstGeom prst="rect">
+            <a:avLst/>
+          </a:prstGeom>
+        </p:spPr>
+      </p:pic>
+    </p:spTree>
+    <p:extLst>
+      <p:ext uri="{BB962C8B-B14F-4D97-AF65-F5344CB8AC3E}">
+        <p14:creationId xmlns:p14="http://schemas.microsoft.com/office/powerpoint/2010/main" val="3475947136"/>
+      </p:ext>
+    </p:extLst>
+  </p:cSld>
+  <p:clrMapOvr>
+    <a:masterClrMapping/>
+  </p:clrMapOvr>
+  <p:timing>
+    <p:tnLst>
+      <p:par>
+        <p:cTn id="1" dur="indefinite" restart="never" nodeType="tmRoot"/>
+      </p:par>
+    </p:tnLst>
+  </p:timing>
+</p:sld>
+</file>
+
+<file path=ppt/slides/slide94.xml><?xml version="1.0" encoding="utf-8"?>
+<p:sld xmlns:a="http://schemas.openxmlformats.org/drawingml/2006/main" xmlns:r="http://schemas.openxmlformats.org/officeDocument/2006/relationships" xmlns:p="http://schemas.openxmlformats.org/presentationml/2006/main">
+  <p:cSld>
+    <p:spTree>
+      <p:nvGrpSpPr>
+        <p:cNvPr id="1" name=""/>
+        <p:cNvGrpSpPr/>
+        <p:nvPr/>
+      </p:nvGrpSpPr>
+      <p:grpSpPr>
+        <a:xfrm>
+          <a:off x="0" y="0"/>
+          <a:ext cx="0" cy="0"/>
+          <a:chOff x="0" y="0"/>
+          <a:chExt cx="0" cy="0"/>
+        </a:xfrm>
+      </p:grpSpPr>
+      <p:sp>
+        <p:nvSpPr>
+          <p:cNvPr id="2" name="Title 1"/>
+          <p:cNvSpPr>
+            <a:spLocks noGrp="1"/>
+          </p:cNvSpPr>
+          <p:nvPr>
+            <p:ph type="title"/>
+          </p:nvPr>
+        </p:nvSpPr>
+        <p:spPr/>
+        <p:txBody>
+          <a:bodyPr/>
+          <a:lstStyle/>
+          <a:p>
+            <a:r>
+              <a:rPr lang="en-US" dirty="0" smtClean="0"/>
+              <a:t>We!</a:t>
+            </a:r>
+            <a:endParaRPr lang="en-US" dirty="0"/>
+          </a:p>
+        </p:txBody>
+      </p:sp>
+      <p:sp>
+        <p:nvSpPr>
+          <p:cNvPr id="3" name="Content Placeholder 2"/>
+          <p:cNvSpPr>
+            <a:spLocks noGrp="1"/>
+          </p:cNvSpPr>
+          <p:nvPr>
+            <p:ph idx="1"/>
+          </p:nvPr>
+        </p:nvSpPr>
+        <p:spPr/>
+        <p:txBody>
+          <a:bodyPr>
+            <a:normAutofit/>
+          </a:bodyPr>
+          <a:lstStyle/>
+          <a:p>
+            <a:r>
+              <a:rPr lang="en-US" sz="5400" dirty="0" smtClean="0"/>
+              <a:t>Ingrained habits</a:t>
+            </a:r>
+          </a:p>
+          <a:p>
+            <a:r>
+              <a:rPr lang="en-US" sz="5400" dirty="0" smtClean="0"/>
+              <a:t>New skills to learn</a:t>
+            </a:r>
+          </a:p>
+          <a:p>
+            <a:r>
+              <a:rPr lang="en-US" sz="5400" dirty="0" smtClean="0"/>
+              <a:t>New methods to </a:t>
+            </a:r>
+            <a:r>
+              <a:rPr lang="en-US" sz="5400" dirty="0" smtClean="0"/>
+              <a:t>use</a:t>
+            </a:r>
+          </a:p>
+        </p:txBody>
+      </p:sp>
+    </p:spTree>
+    <p:extLst>
+      <p:ext uri="{BB962C8B-B14F-4D97-AF65-F5344CB8AC3E}">
+        <p14:creationId xmlns:p14="http://schemas.microsoft.com/office/powerpoint/2010/main" val="4167916637"/>
+      </p:ext>
+    </p:extLst>
+  </p:cSld>
+  <p:clrMapOvr>
+    <a:masterClrMapping/>
+  </p:clrMapOvr>
+  <p:timing>
+    <p:tnLst>
+      <p:par>
+        <p:cTn id="1" dur="indefinite" restart="never" nodeType="tmRoot"/>
+      </p:par>
+    </p:tnLst>
+  </p:timing>
+</p:sld>
+</file>
+
+<file path=ppt/slides/slide95.xml><?xml version="1.0" encoding="utf-8"?>
+<p:sld xmlns:a="http://schemas.openxmlformats.org/drawingml/2006/main" xmlns:r="http://schemas.openxmlformats.org/officeDocument/2006/relationships" xmlns:p="http://schemas.openxmlformats.org/presentationml/2006/main">
+  <p:cSld>
+    <p:spTree>
+      <p:nvGrpSpPr>
+        <p:cNvPr id="1" name=""/>
+        <p:cNvGrpSpPr/>
+        <p:nvPr/>
+      </p:nvGrpSpPr>
+      <p:grpSpPr>
+        <a:xfrm>
+          <a:off x="0" y="0"/>
+          <a:ext cx="0" cy="0"/>
+          <a:chOff x="0" y="0"/>
+          <a:chExt cx="0" cy="0"/>
+        </a:xfrm>
+      </p:grpSpPr>
+      <p:sp>
+        <p:nvSpPr>
+          <p:cNvPr id="4" name="Title 3"/>
+          <p:cNvSpPr>
+            <a:spLocks noGrp="1"/>
+          </p:cNvSpPr>
+          <p:nvPr>
+            <p:ph type="title"/>
+          </p:nvPr>
+        </p:nvSpPr>
+        <p:spPr/>
+        <p:txBody>
+          <a:bodyPr/>
+          <a:lstStyle/>
+          <a:p>
+            <a:r>
+              <a:rPr lang="en-US" dirty="0"/>
+              <a:t>Push for better support…</a:t>
+            </a:r>
+          </a:p>
+        </p:txBody>
+      </p:sp>
+    </p:spTree>
+    <p:extLst>
+      <p:ext uri="{BB962C8B-B14F-4D97-AF65-F5344CB8AC3E}">
+        <p14:creationId xmlns:p14="http://schemas.microsoft.com/office/powerpoint/2010/main" val="3428482361"/>
+      </p:ext>
+    </p:extLst>
+  </p:cSld>
+  <p:clrMapOvr>
+    <a:masterClrMapping/>
+  </p:clrMapOvr>
+  <p:timing>
+    <p:tnLst>
+      <p:par>
+        <p:cTn id="1" dur="indefinite" restart="never" nodeType="tmRoot"/>
+      </p:par>
+    </p:tnLst>
+  </p:timing>
+</p:sld>
+</file>
+
+<file path=ppt/slides/slide96.xml><?xml version="1.0" encoding="utf-8"?>
+<p:sld xmlns:a="http://schemas.openxmlformats.org/drawingml/2006/main" xmlns:r="http://schemas.openxmlformats.org/officeDocument/2006/relationships" xmlns:p="http://schemas.openxmlformats.org/presentationml/2006/main">
+  <p:cSld>
+    <p:spTree>
+      <p:nvGrpSpPr>
+        <p:cNvPr id="1" name=""/>
+        <p:cNvGrpSpPr/>
+        <p:nvPr/>
+      </p:nvGrpSpPr>
+      <p:grpSpPr>
+        <a:xfrm>
+          <a:off x="0" y="0"/>
+          <a:ext cx="0" cy="0"/>
+          <a:chOff x="0" y="0"/>
+          <a:chExt cx="0" cy="0"/>
+        </a:xfrm>
+      </p:grpSpPr>
+      <p:sp>
+        <p:nvSpPr>
+          <p:cNvPr id="4" name="Title 3"/>
+          <p:cNvSpPr>
+            <a:spLocks noGrp="1"/>
+          </p:cNvSpPr>
+          <p:nvPr>
+            <p:ph type="title"/>
+          </p:nvPr>
+        </p:nvSpPr>
+        <p:spPr/>
+        <p:txBody>
+          <a:bodyPr/>
+          <a:lstStyle/>
+          <a:p>
+            <a:r>
+              <a:rPr lang="en-US" dirty="0" smtClean="0"/>
+              <a:t>Researchers: New skills to learn/teach</a:t>
+            </a:r>
+            <a:endParaRPr lang="en-US" dirty="0"/>
+          </a:p>
+        </p:txBody>
+      </p:sp>
+      <p:sp>
+        <p:nvSpPr>
+          <p:cNvPr id="5" name="Content Placeholder 4"/>
+          <p:cNvSpPr>
+            <a:spLocks noGrp="1"/>
+          </p:cNvSpPr>
+          <p:nvPr>
+            <p:ph idx="1"/>
+          </p:nvPr>
+        </p:nvSpPr>
+        <p:spPr/>
+        <p:txBody>
+          <a:bodyPr>
+            <a:normAutofit/>
+          </a:bodyPr>
+          <a:lstStyle/>
+          <a:p>
+            <a:r>
+              <a:rPr lang="en-US" sz="3600" dirty="0" smtClean="0"/>
+              <a:t>How to </a:t>
+            </a:r>
+            <a:r>
+              <a:rPr lang="en-US" sz="4000" b="1" dirty="0" smtClean="0">
+                <a:solidFill>
+                  <a:schemeClr val="accent2">
+                    <a:lumMod val="75000"/>
+                  </a:schemeClr>
+                </a:solidFill>
+              </a:rPr>
+              <a:t>incorporate reproducible practices </a:t>
+            </a:r>
+            <a:r>
+              <a:rPr lang="en-US" sz="3600" dirty="0" smtClean="0"/>
+              <a:t>into your workflow</a:t>
+            </a:r>
+          </a:p>
+          <a:p>
+            <a:r>
+              <a:rPr lang="en-US" sz="3600" dirty="0"/>
+              <a:t>When to </a:t>
+            </a:r>
+            <a:r>
+              <a:rPr lang="en-US" sz="4000" b="1" dirty="0">
+                <a:solidFill>
+                  <a:schemeClr val="accent6">
+                    <a:lumMod val="75000"/>
+                  </a:schemeClr>
+                </a:solidFill>
+              </a:rPr>
+              <a:t>pre-register</a:t>
+            </a:r>
+            <a:r>
+              <a:rPr lang="en-US" sz="3600" dirty="0"/>
+              <a:t>, and when not to</a:t>
+            </a:r>
+          </a:p>
+          <a:p>
+            <a:r>
+              <a:rPr lang="en-US" sz="4000" b="1" dirty="0">
+                <a:solidFill>
+                  <a:schemeClr val="accent5">
+                    <a:lumMod val="75000"/>
+                  </a:schemeClr>
+                </a:solidFill>
+              </a:rPr>
+              <a:t>Document</a:t>
+            </a:r>
+            <a:r>
+              <a:rPr lang="en-US" sz="3600" dirty="0"/>
+              <a:t> early, and </a:t>
+            </a:r>
+            <a:r>
+              <a:rPr lang="en-US" sz="3600" dirty="0" smtClean="0"/>
+              <a:t>often (better READMEs!)</a:t>
+            </a:r>
+            <a:endParaRPr lang="en-US" sz="3600" dirty="0"/>
+          </a:p>
+          <a:p>
+            <a:r>
+              <a:rPr lang="en-US" sz="3600" dirty="0" smtClean="0"/>
+              <a:t>How, where, and when to </a:t>
+            </a:r>
+            <a:r>
+              <a:rPr lang="en-US" sz="4400" b="1" dirty="0" smtClean="0">
+                <a:solidFill>
+                  <a:schemeClr val="accent2">
+                    <a:lumMod val="75000"/>
+                  </a:schemeClr>
+                </a:solidFill>
+              </a:rPr>
+              <a:t>archive data and code</a:t>
+            </a:r>
+            <a:endParaRPr lang="en-US" sz="3600" b="1" dirty="0" smtClean="0">
+              <a:solidFill>
+                <a:schemeClr val="accent2">
+                  <a:lumMod val="75000"/>
+                </a:schemeClr>
+              </a:solidFill>
+            </a:endParaRPr>
+          </a:p>
+          <a:p>
+            <a:r>
+              <a:rPr lang="en-US" sz="3600" dirty="0" smtClean="0"/>
+              <a:t>How to </a:t>
+            </a:r>
+            <a:r>
+              <a:rPr lang="en-US" sz="4000" b="1" dirty="0" smtClean="0">
+                <a:solidFill>
+                  <a:schemeClr val="accent6">
+                    <a:lumMod val="75000"/>
+                  </a:schemeClr>
+                </a:solidFill>
+              </a:rPr>
+              <a:t>license</a:t>
+            </a:r>
+            <a:r>
+              <a:rPr lang="en-US" sz="3600" dirty="0" smtClean="0"/>
+              <a:t> your contributions!</a:t>
+            </a:r>
+          </a:p>
+        </p:txBody>
+      </p:sp>
+    </p:spTree>
+    <p:extLst>
+      <p:ext uri="{BB962C8B-B14F-4D97-AF65-F5344CB8AC3E}">
+        <p14:creationId xmlns:p14="http://schemas.microsoft.com/office/powerpoint/2010/main" val="2490240518"/>
+      </p:ext>
+    </p:extLst>
+  </p:cSld>
+  <p:clrMapOvr>
+    <a:masterClrMapping/>
+  </p:clrMapOvr>
+  <mc:AlternateContent xmlns:mc="http://schemas.openxmlformats.org/markup-compatibility/2006" xmlns:p14="http://schemas.microsoft.com/office/powerpoint/2010/main">
+    <mc:Choice Requires="p14">
+      <p:transition spd="slow" p14:dur="2000"/>
+    </mc:Choice>
+    <mc:Fallback xmlns="">
+      <p:transition spd="slow"/>
+    </mc:Fallback>
+  </mc:AlternateContent>
+  <p:timing>
+    <p:tnLst>
+      <p:par>
+        <p:cTn id="1" dur="indefinite" restart="never" nodeType="tmRoot"/>
+      </p:par>
+    </p:tnLst>
+  </p:timing>
+</p:sld>
+</file>
+
+<file path=ppt/slides/slide97.xml><?xml version="1.0" encoding="utf-8"?>
+<p:sld xmlns:a="http://schemas.openxmlformats.org/drawingml/2006/main" xmlns:r="http://schemas.openxmlformats.org/officeDocument/2006/relationships" xmlns:p="http://schemas.openxmlformats.org/presentationml/2006/main">
+  <p:cSld>
+    <p:spTree>
+      <p:nvGrpSpPr>
+        <p:cNvPr id="1" name=""/>
+        <p:cNvGrpSpPr/>
+        <p:nvPr/>
+      </p:nvGrpSpPr>
+      <p:grpSpPr>
+        <a:xfrm>
+          <a:off x="0" y="0"/>
+          <a:ext cx="0" cy="0"/>
+          <a:chOff x="0" y="0"/>
+          <a:chExt cx="0" cy="0"/>
+        </a:xfrm>
+      </p:grpSpPr>
+      <p:sp>
+        <p:nvSpPr>
           <p:cNvPr id="3" name="Rectangle 2"/>
           <p:cNvSpPr/>
           <p:nvPr/>
@@ -31714,7 +33090,7 @@
 </p:sld>
 </file>
 
-<file path=ppt/slides/slide91.xml><?xml version="1.0" encoding="utf-8"?>
+<file path=ppt/slides/slide98.xml><?xml version="1.0" encoding="utf-8"?>
 <p:sld xmlns:a="http://schemas.openxmlformats.org/drawingml/2006/main" xmlns:r="http://schemas.openxmlformats.org/officeDocument/2006/relationships" xmlns:p="http://schemas.openxmlformats.org/presentationml/2006/main">
   <p:cSld>
     <p:spTree>
@@ -31946,7 +33322,7 @@
 </p:sld>
 </file>
 
-<file path=ppt/slides/slide92.xml><?xml version="1.0" encoding="utf-8"?>
+<file path=ppt/slides/slide99.xml><?xml version="1.0" encoding="utf-8"?>
 <p:sld xmlns:a="http://schemas.openxmlformats.org/drawingml/2006/main" xmlns:r="http://schemas.openxmlformats.org/officeDocument/2006/relationships" xmlns:p="http://schemas.openxmlformats.org/presentationml/2006/main">
   <p:cSld>
     <p:spTree>
@@ -32068,393 +33444,6 @@
       <p:transition spd="slow"/>
     </mc:Fallback>
   </mc:AlternateContent>
-  <p:timing>
-    <p:tnLst>
-      <p:par>
-        <p:cTn id="1" dur="indefinite" restart="never" nodeType="tmRoot"/>
-      </p:par>
-    </p:tnLst>
-  </p:timing>
-</p:sld>
-</file>
-
-<file path=ppt/slides/slide93.xml><?xml version="1.0" encoding="utf-8"?>
-<p:sld xmlns:a="http://schemas.openxmlformats.org/drawingml/2006/main" xmlns:r="http://schemas.openxmlformats.org/officeDocument/2006/relationships" xmlns:p="http://schemas.openxmlformats.org/presentationml/2006/main">
-  <p:cSld>
-    <p:spTree>
-      <p:nvGrpSpPr>
-        <p:cNvPr id="1" name=""/>
-        <p:cNvGrpSpPr/>
-        <p:nvPr/>
-      </p:nvGrpSpPr>
-      <p:grpSpPr>
-        <a:xfrm>
-          <a:off x="0" y="0"/>
-          <a:ext cx="0" cy="0"/>
-          <a:chOff x="0" y="0"/>
-          <a:chExt cx="0" cy="0"/>
-        </a:xfrm>
-      </p:grpSpPr>
-      <p:sp>
-        <p:nvSpPr>
-          <p:cNvPr id="5" name="Title 4"/>
-          <p:cNvSpPr>
-            <a:spLocks noGrp="1"/>
-          </p:cNvSpPr>
-          <p:nvPr>
-            <p:ph type="title"/>
-          </p:nvPr>
-        </p:nvSpPr>
-        <p:spPr/>
-        <p:txBody>
-          <a:bodyPr/>
-          <a:lstStyle/>
-          <a:p>
-            <a:r>
-              <a:rPr lang="en-US" dirty="0" smtClean="0"/>
-              <a:t>Goals</a:t>
-            </a:r>
-            <a:endParaRPr lang="en-US" dirty="0"/>
-          </a:p>
-        </p:txBody>
-      </p:sp>
-      <p:sp>
-        <p:nvSpPr>
-          <p:cNvPr id="6" name="Content Placeholder 5"/>
-          <p:cNvSpPr>
-            <a:spLocks noGrp="1"/>
-          </p:cNvSpPr>
-          <p:nvPr>
-            <p:ph idx="1"/>
-          </p:nvPr>
-        </p:nvSpPr>
-        <p:spPr/>
-        <p:txBody>
-          <a:bodyPr>
-            <a:normAutofit/>
-          </a:bodyPr>
-          <a:lstStyle/>
-          <a:p>
-            <a:r>
-              <a:rPr lang="en-US" sz="4000" b="1" dirty="0" smtClean="0">
-                <a:solidFill>
-                  <a:schemeClr val="accent1">
-                    <a:lumMod val="50000"/>
-                  </a:schemeClr>
-                </a:solidFill>
-              </a:rPr>
-              <a:t>Greater transparency</a:t>
-            </a:r>
-          </a:p>
-          <a:p>
-            <a:pPr lvl="1"/>
-            <a:r>
-              <a:rPr lang="en-US" sz="3600" dirty="0" smtClean="0"/>
-              <a:t>Equal treatment of public-use and confidential data</a:t>
-            </a:r>
-          </a:p>
-          <a:p>
-            <a:r>
-              <a:rPr lang="en-US" sz="4000" b="1" dirty="0" smtClean="0">
-                <a:solidFill>
-                  <a:schemeClr val="accent6">
-                    <a:lumMod val="75000"/>
-                  </a:schemeClr>
-                </a:solidFill>
-              </a:rPr>
-              <a:t>Better computational reproducibility</a:t>
-            </a:r>
-          </a:p>
-          <a:p>
-            <a:pPr lvl="1"/>
-            <a:r>
-              <a:rPr lang="en-US" sz="3600" dirty="0" smtClean="0"/>
-              <a:t>For public data as well as confidential data</a:t>
-            </a:r>
-          </a:p>
-          <a:p>
-            <a:r>
-              <a:rPr lang="en-US" sz="4000" b="1" dirty="0" smtClean="0">
-                <a:solidFill>
-                  <a:schemeClr val="accent4">
-                    <a:lumMod val="75000"/>
-                  </a:schemeClr>
-                </a:solidFill>
-              </a:rPr>
-              <a:t>Greater reliance on shared resources</a:t>
-            </a:r>
-          </a:p>
-          <a:p>
-            <a:pPr lvl="1"/>
-            <a:r>
-              <a:rPr lang="en-US" sz="3600" dirty="0" smtClean="0"/>
-              <a:t>Encourage best practices</a:t>
-            </a:r>
-          </a:p>
-        </p:txBody>
-      </p:sp>
-    </p:spTree>
-    <p:extLst>
-      <p:ext uri="{BB962C8B-B14F-4D97-AF65-F5344CB8AC3E}">
-        <p14:creationId xmlns:p14="http://schemas.microsoft.com/office/powerpoint/2010/main" val="3911607236"/>
-      </p:ext>
-    </p:extLst>
-  </p:cSld>
-  <p:clrMapOvr>
-    <a:masterClrMapping/>
-  </p:clrMapOvr>
-  <p:timing>
-    <p:tnLst>
-      <p:par>
-        <p:cTn id="1" dur="indefinite" restart="never" nodeType="tmRoot"/>
-      </p:par>
-    </p:tnLst>
-  </p:timing>
-</p:sld>
-</file>
-
-<file path=ppt/slides/slide94.xml><?xml version="1.0" encoding="utf-8"?>
-<p:sld xmlns:a="http://schemas.openxmlformats.org/drawingml/2006/main" xmlns:r="http://schemas.openxmlformats.org/officeDocument/2006/relationships" xmlns:p="http://schemas.openxmlformats.org/presentationml/2006/main">
-  <p:cSld>
-    <p:spTree>
-      <p:nvGrpSpPr>
-        <p:cNvPr id="1" name=""/>
-        <p:cNvGrpSpPr/>
-        <p:nvPr/>
-      </p:nvGrpSpPr>
-      <p:grpSpPr>
-        <a:xfrm>
-          <a:off x="0" y="0"/>
-          <a:ext cx="0" cy="0"/>
-          <a:chOff x="0" y="0"/>
-          <a:chExt cx="0" cy="0"/>
-        </a:xfrm>
-      </p:grpSpPr>
-      <p:sp>
-        <p:nvSpPr>
-          <p:cNvPr id="5" name="Title 4"/>
-          <p:cNvSpPr>
-            <a:spLocks noGrp="1"/>
-          </p:cNvSpPr>
-          <p:nvPr>
-            <p:ph type="title"/>
-          </p:nvPr>
-        </p:nvSpPr>
-        <p:spPr/>
-        <p:txBody>
-          <a:bodyPr/>
-          <a:lstStyle/>
-          <a:p>
-            <a:r>
-              <a:rPr lang="en-US" dirty="0" smtClean="0"/>
-              <a:t>Challenges for Restricted-Access Data</a:t>
-            </a:r>
-            <a:endParaRPr lang="en-US" dirty="0"/>
-          </a:p>
-        </p:txBody>
-      </p:sp>
-      <p:sp>
-        <p:nvSpPr>
-          <p:cNvPr id="6" name="Content Placeholder 5"/>
-          <p:cNvSpPr>
-            <a:spLocks noGrp="1"/>
-          </p:cNvSpPr>
-          <p:nvPr>
-            <p:ph idx="1"/>
-          </p:nvPr>
-        </p:nvSpPr>
-        <p:spPr/>
-        <p:txBody>
-          <a:bodyPr>
-            <a:normAutofit/>
-          </a:bodyPr>
-          <a:lstStyle/>
-          <a:p>
-            <a:r>
-              <a:rPr lang="en-US" sz="4000" b="1" dirty="0" smtClean="0">
-                <a:solidFill>
-                  <a:schemeClr val="accent1">
-                    <a:lumMod val="50000"/>
-                  </a:schemeClr>
-                </a:solidFill>
-              </a:rPr>
-              <a:t>Verifiability</a:t>
-            </a:r>
-            <a:endParaRPr lang="en-US" sz="4000" b="1" dirty="0" smtClean="0">
-              <a:solidFill>
-                <a:schemeClr val="accent1">
-                  <a:lumMod val="50000"/>
-                </a:schemeClr>
-              </a:solidFill>
-            </a:endParaRPr>
-          </a:p>
-          <a:p>
-            <a:pPr lvl="1"/>
-            <a:r>
-              <a:rPr lang="en-US" sz="3600" dirty="0" smtClean="0"/>
-              <a:t>How can others obtain access?</a:t>
-            </a:r>
-            <a:endParaRPr lang="en-US" sz="3600" dirty="0" smtClean="0"/>
-          </a:p>
-          <a:p>
-            <a:r>
-              <a:rPr lang="en-US" sz="4000" b="1" dirty="0" smtClean="0">
-                <a:solidFill>
-                  <a:schemeClr val="accent6">
-                    <a:lumMod val="75000"/>
-                  </a:schemeClr>
-                </a:solidFill>
-              </a:rPr>
-              <a:t>Documentation</a:t>
-            </a:r>
-            <a:endParaRPr lang="en-US" sz="4000" b="1" dirty="0" smtClean="0">
-              <a:solidFill>
-                <a:schemeClr val="accent6">
-                  <a:lumMod val="75000"/>
-                </a:schemeClr>
-              </a:solidFill>
-            </a:endParaRPr>
-          </a:p>
-          <a:p>
-            <a:pPr lvl="1"/>
-            <a:r>
-              <a:rPr lang="en-US" sz="3600" dirty="0" smtClean="0"/>
-              <a:t>How can others learn about the data?</a:t>
-            </a:r>
-            <a:endParaRPr lang="en-US" sz="3600" dirty="0" smtClean="0"/>
-          </a:p>
-          <a:p>
-            <a:r>
-              <a:rPr lang="en-US" sz="4000" b="1" dirty="0" smtClean="0">
-                <a:solidFill>
-                  <a:schemeClr val="accent4">
-                    <a:lumMod val="75000"/>
-                  </a:schemeClr>
-                </a:solidFill>
-              </a:rPr>
-              <a:t>Persistence</a:t>
-            </a:r>
-            <a:endParaRPr lang="en-US" sz="4000" b="1" dirty="0" smtClean="0">
-              <a:solidFill>
-                <a:schemeClr val="accent4">
-                  <a:lumMod val="75000"/>
-                </a:schemeClr>
-              </a:solidFill>
-            </a:endParaRPr>
-          </a:p>
-          <a:p>
-            <a:pPr lvl="1"/>
-            <a:r>
-              <a:rPr lang="en-US" sz="3600" dirty="0" smtClean="0"/>
-              <a:t>How are data and programs preserved?</a:t>
-            </a:r>
-            <a:endParaRPr lang="en-US" sz="3600" dirty="0" smtClean="0"/>
-          </a:p>
-        </p:txBody>
-      </p:sp>
-    </p:spTree>
-    <p:extLst>
-      <p:ext uri="{BB962C8B-B14F-4D97-AF65-F5344CB8AC3E}">
-        <p14:creationId xmlns:p14="http://schemas.microsoft.com/office/powerpoint/2010/main" val="401567628"/>
-      </p:ext>
-    </p:extLst>
-  </p:cSld>
-  <p:clrMapOvr>
-    <a:masterClrMapping/>
-  </p:clrMapOvr>
-  <p:timing>
-    <p:tnLst>
-      <p:par>
-        <p:cTn id="1" dur="indefinite" restart="never" nodeType="tmRoot"/>
-      </p:par>
-    </p:tnLst>
-  </p:timing>
-</p:sld>
-</file>
-
-<file path=ppt/slides/slide95.xml><?xml version="1.0" encoding="utf-8"?>
-<p:sld xmlns:a="http://schemas.openxmlformats.org/drawingml/2006/main" xmlns:r="http://schemas.openxmlformats.org/officeDocument/2006/relationships" xmlns:p="http://schemas.openxmlformats.org/presentationml/2006/main">
-  <p:cSld>
-    <p:bg>
-      <p:bgPr>
-        <a:solidFill>
-          <a:schemeClr val="tx1"/>
-        </a:solidFill>
-        <a:effectLst/>
-      </p:bgPr>
-    </p:bg>
-    <p:spTree>
-      <p:nvGrpSpPr>
-        <p:cNvPr id="1" name=""/>
-        <p:cNvGrpSpPr/>
-        <p:nvPr/>
-      </p:nvGrpSpPr>
-      <p:grpSpPr>
-        <a:xfrm>
-          <a:off x="0" y="0"/>
-          <a:ext cx="0" cy="0"/>
-          <a:chOff x="0" y="0"/>
-          <a:chExt cx="0" cy="0"/>
-        </a:xfrm>
-      </p:grpSpPr>
-      <p:sp>
-        <p:nvSpPr>
-          <p:cNvPr id="2" name="Rectangle 1"/>
-          <p:cNvSpPr/>
-          <p:nvPr/>
-        </p:nvSpPr>
-        <p:spPr>
-          <a:xfrm>
-            <a:off x="2832100" y="1981200"/>
-            <a:ext cx="7239000" cy="2590800"/>
-          </a:xfrm>
-          <a:prstGeom prst="rect">
-            <a:avLst/>
-          </a:prstGeom>
-          <a:noFill/>
-          <a:ln>
-            <a:noFill/>
-          </a:ln>
-        </p:spPr>
-        <p:style>
-          <a:lnRef idx="2">
-            <a:schemeClr val="accent1">
-              <a:shade val="50000"/>
-            </a:schemeClr>
-          </a:lnRef>
-          <a:fillRef idx="1">
-            <a:schemeClr val="accent1"/>
-          </a:fillRef>
-          <a:effectRef idx="0">
-            <a:schemeClr val="accent1"/>
-          </a:effectRef>
-          <a:fontRef idx="minor">
-            <a:schemeClr val="lt1"/>
-          </a:fontRef>
-        </p:style>
-        <p:txBody>
-          <a:bodyPr rtlCol="0" anchor="ctr"/>
-          <a:lstStyle/>
-          <a:p>
-            <a:pPr algn="ctr"/>
-            <a:r>
-              <a:rPr lang="en-US" sz="6600" b="1" smtClean="0"/>
-              <a:t>Merci!</a:t>
-            </a:r>
-            <a:endParaRPr lang="en-US" sz="6600" b="1" dirty="0"/>
-          </a:p>
-        </p:txBody>
-      </p:sp>
-    </p:spTree>
-    <p:extLst>
-      <p:ext uri="{BB962C8B-B14F-4D97-AF65-F5344CB8AC3E}">
-        <p14:creationId xmlns:p14="http://schemas.microsoft.com/office/powerpoint/2010/main" val="676275531"/>
-      </p:ext>
-    </p:extLst>
-  </p:cSld>
-  <p:clrMapOvr>
-    <a:masterClrMapping/>
-  </p:clrMapOvr>
   <p:timing>
     <p:tnLst>
       <p:par>

</xml_diff>

<commit_message>
Animation for 1 slide
</commit_message>
<xml_diff>
--- a/Vilhuber-Presentation2019-Montreal-2019-04-05.pptx
+++ b/Vilhuber-Presentation2019-Montreal-2019-04-05.pptx
@@ -115,24 +115,24 @@
   <p:notesSz cx="6858000" cy="9144000"/>
   <p:embeddedFontLst>
     <p:embeddedFont>
-      <p:font typeface="Calibri Light" panose="020F0302020204030204" pitchFamily="34" charset="0"/>
+      <p:font typeface="Calibri" panose="020F0502020204030204" pitchFamily="34" charset="0"/>
       <p:regular r:id="rId105"/>
-      <p:italic r:id="rId106"/>
-    </p:embeddedFont>
-    <p:embeddedFont>
-      <p:font typeface="Calibri" panose="020F0502020204030204" pitchFamily="34" charset="0"/>
-      <p:regular r:id="rId107"/>
-      <p:bold r:id="rId108"/>
-      <p:italic r:id="rId109"/>
-      <p:boldItalic r:id="rId110"/>
+      <p:bold r:id="rId106"/>
+      <p:italic r:id="rId107"/>
+      <p:boldItalic r:id="rId108"/>
     </p:embeddedFont>
     <p:embeddedFont>
       <p:font typeface="Roboto" panose="020B0604020202020204" charset="0"/>
-      <p:regular r:id="rId111"/>
+      <p:regular r:id="rId109"/>
     </p:embeddedFont>
     <p:embeddedFont>
       <p:font typeface="Century" panose="02040604050505020304" pitchFamily="18" charset="0"/>
-      <p:regular r:id="rId112"/>
+      <p:regular r:id="rId110"/>
+    </p:embeddedFont>
+    <p:embeddedFont>
+      <p:font typeface="Calibri Light" panose="020F0302020204030204" pitchFamily="34" charset="0"/>
+      <p:regular r:id="rId111"/>
+      <p:italic r:id="rId112"/>
     </p:embeddedFont>
   </p:embeddedFontLst>
   <p:defaultTextStyle>
@@ -32602,7 +32602,276 @@
   <p:timing>
     <p:tnLst>
       <p:par>
-        <p:cTn id="1" dur="indefinite" restart="never" nodeType="tmRoot"/>
+        <p:cTn id="1" dur="indefinite" restart="never" nodeType="tmRoot">
+          <p:childTnLst>
+            <p:seq concurrent="1" nextAc="seek">
+              <p:cTn id="2" dur="indefinite" nodeType="mainSeq">
+                <p:childTnLst>
+                  <p:par>
+                    <p:cTn id="3" fill="hold">
+                      <p:stCondLst>
+                        <p:cond delay="indefinite"/>
+                        <p:cond evt="onBegin" delay="0">
+                          <p:tn val="2"/>
+                        </p:cond>
+                      </p:stCondLst>
+                      <p:childTnLst>
+                        <p:par>
+                          <p:cTn id="4" fill="hold">
+                            <p:stCondLst>
+                              <p:cond delay="0"/>
+                            </p:stCondLst>
+                            <p:childTnLst>
+                              <p:par>
+                                <p:cTn id="5" presetID="1" presetClass="entr" presetSubtype="0" fill="hold" nodeType="afterEffect">
+                                  <p:stCondLst>
+                                    <p:cond delay="250"/>
+                                  </p:stCondLst>
+                                  <p:childTnLst>
+                                    <p:set>
+                                      <p:cBhvr>
+                                        <p:cTn id="6" dur="1" fill="hold">
+                                          <p:stCondLst>
+                                            <p:cond delay="0"/>
+                                          </p:stCondLst>
+                                        </p:cTn>
+                                        <p:tgtEl>
+                                          <p:spTgt spid="5"/>
+                                        </p:tgtEl>
+                                        <p:attrNameLst>
+                                          <p:attrName>style.visibility</p:attrName>
+                                        </p:attrNameLst>
+                                      </p:cBhvr>
+                                      <p:to>
+                                        <p:strVal val="visible"/>
+                                      </p:to>
+                                    </p:set>
+                                  </p:childTnLst>
+                                </p:cTn>
+                              </p:par>
+                            </p:childTnLst>
+                          </p:cTn>
+                        </p:par>
+                      </p:childTnLst>
+                    </p:cTn>
+                  </p:par>
+                  <p:par>
+                    <p:cTn id="7" fill="hold">
+                      <p:stCondLst>
+                        <p:cond delay="indefinite"/>
+                      </p:stCondLst>
+                      <p:childTnLst>
+                        <p:par>
+                          <p:cTn id="8" fill="hold">
+                            <p:stCondLst>
+                              <p:cond delay="0"/>
+                            </p:stCondLst>
+                            <p:childTnLst>
+                              <p:par>
+                                <p:cTn id="9" presetID="1" presetClass="entr" presetSubtype="0" fill="hold" nodeType="clickEffect">
+                                  <p:stCondLst>
+                                    <p:cond delay="0"/>
+                                  </p:stCondLst>
+                                  <p:childTnLst>
+                                    <p:set>
+                                      <p:cBhvr>
+                                        <p:cTn id="10" dur="1" fill="hold">
+                                          <p:stCondLst>
+                                            <p:cond delay="0"/>
+                                          </p:stCondLst>
+                                        </p:cTn>
+                                        <p:tgtEl>
+                                          <p:spTgt spid="6"/>
+                                        </p:tgtEl>
+                                        <p:attrNameLst>
+                                          <p:attrName>style.visibility</p:attrName>
+                                        </p:attrNameLst>
+                                      </p:cBhvr>
+                                      <p:to>
+                                        <p:strVal val="visible"/>
+                                      </p:to>
+                                    </p:set>
+                                  </p:childTnLst>
+                                </p:cTn>
+                              </p:par>
+                            </p:childTnLst>
+                          </p:cTn>
+                        </p:par>
+                      </p:childTnLst>
+                    </p:cTn>
+                  </p:par>
+                  <p:par>
+                    <p:cTn id="11" fill="hold">
+                      <p:stCondLst>
+                        <p:cond delay="indefinite"/>
+                      </p:stCondLst>
+                      <p:childTnLst>
+                        <p:par>
+                          <p:cTn id="12" fill="hold">
+                            <p:stCondLst>
+                              <p:cond delay="0"/>
+                            </p:stCondLst>
+                            <p:childTnLst>
+                              <p:par>
+                                <p:cTn id="13" presetID="1" presetClass="entr" presetSubtype="0" fill="hold" nodeType="clickEffect">
+                                  <p:stCondLst>
+                                    <p:cond delay="0"/>
+                                  </p:stCondLst>
+                                  <p:childTnLst>
+                                    <p:set>
+                                      <p:cBhvr>
+                                        <p:cTn id="14" dur="1" fill="hold">
+                                          <p:stCondLst>
+                                            <p:cond delay="0"/>
+                                          </p:stCondLst>
+                                        </p:cTn>
+                                        <p:tgtEl>
+                                          <p:spTgt spid="7"/>
+                                        </p:tgtEl>
+                                        <p:attrNameLst>
+                                          <p:attrName>style.visibility</p:attrName>
+                                        </p:attrNameLst>
+                                      </p:cBhvr>
+                                      <p:to>
+                                        <p:strVal val="visible"/>
+                                      </p:to>
+                                    </p:set>
+                                  </p:childTnLst>
+                                </p:cTn>
+                              </p:par>
+                            </p:childTnLst>
+                          </p:cTn>
+                        </p:par>
+                        <p:par>
+                          <p:cTn id="15" fill="hold">
+                            <p:stCondLst>
+                              <p:cond delay="0"/>
+                            </p:stCondLst>
+                            <p:childTnLst>
+                              <p:par>
+                                <p:cTn id="16" presetID="1" presetClass="entr" presetSubtype="0" fill="hold" nodeType="afterEffect">
+                                  <p:stCondLst>
+                                    <p:cond delay="250"/>
+                                  </p:stCondLst>
+                                  <p:childTnLst>
+                                    <p:set>
+                                      <p:cBhvr>
+                                        <p:cTn id="17" dur="1" fill="hold">
+                                          <p:stCondLst>
+                                            <p:cond delay="0"/>
+                                          </p:stCondLst>
+                                        </p:cTn>
+                                        <p:tgtEl>
+                                          <p:spTgt spid="8"/>
+                                        </p:tgtEl>
+                                        <p:attrNameLst>
+                                          <p:attrName>style.visibility</p:attrName>
+                                        </p:attrNameLst>
+                                      </p:cBhvr>
+                                      <p:to>
+                                        <p:strVal val="visible"/>
+                                      </p:to>
+                                    </p:set>
+                                  </p:childTnLst>
+                                </p:cTn>
+                              </p:par>
+                            </p:childTnLst>
+                          </p:cTn>
+                        </p:par>
+                        <p:par>
+                          <p:cTn id="18" fill="hold">
+                            <p:stCondLst>
+                              <p:cond delay="250"/>
+                            </p:stCondLst>
+                            <p:childTnLst>
+                              <p:par>
+                                <p:cTn id="19" presetID="1" presetClass="entr" presetSubtype="0" fill="hold" nodeType="afterEffect">
+                                  <p:stCondLst>
+                                    <p:cond delay="250"/>
+                                  </p:stCondLst>
+                                  <p:childTnLst>
+                                    <p:set>
+                                      <p:cBhvr>
+                                        <p:cTn id="20" dur="1" fill="hold">
+                                          <p:stCondLst>
+                                            <p:cond delay="0"/>
+                                          </p:stCondLst>
+                                        </p:cTn>
+                                        <p:tgtEl>
+                                          <p:spTgt spid="9"/>
+                                        </p:tgtEl>
+                                        <p:attrNameLst>
+                                          <p:attrName>style.visibility</p:attrName>
+                                        </p:attrNameLst>
+                                      </p:cBhvr>
+                                      <p:to>
+                                        <p:strVal val="visible"/>
+                                      </p:to>
+                                    </p:set>
+                                  </p:childTnLst>
+                                </p:cTn>
+                              </p:par>
+                            </p:childTnLst>
+                          </p:cTn>
+                        </p:par>
+                        <p:par>
+                          <p:cTn id="21" fill="hold">
+                            <p:stCondLst>
+                              <p:cond delay="500"/>
+                            </p:stCondLst>
+                            <p:childTnLst>
+                              <p:par>
+                                <p:cTn id="22" presetID="1" presetClass="entr" presetSubtype="0" fill="hold" nodeType="afterEffect">
+                                  <p:stCondLst>
+                                    <p:cond delay="250"/>
+                                  </p:stCondLst>
+                                  <p:childTnLst>
+                                    <p:set>
+                                      <p:cBhvr>
+                                        <p:cTn id="23" dur="1" fill="hold">
+                                          <p:stCondLst>
+                                            <p:cond delay="0"/>
+                                          </p:stCondLst>
+                                        </p:cTn>
+                                        <p:tgtEl>
+                                          <p:spTgt spid="10"/>
+                                        </p:tgtEl>
+                                        <p:attrNameLst>
+                                          <p:attrName>style.visibility</p:attrName>
+                                        </p:attrNameLst>
+                                      </p:cBhvr>
+                                      <p:to>
+                                        <p:strVal val="visible"/>
+                                      </p:to>
+                                    </p:set>
+                                  </p:childTnLst>
+                                </p:cTn>
+                              </p:par>
+                            </p:childTnLst>
+                          </p:cTn>
+                        </p:par>
+                      </p:childTnLst>
+                    </p:cTn>
+                  </p:par>
+                </p:childTnLst>
+              </p:cTn>
+              <p:prevCondLst>
+                <p:cond evt="onPrev" delay="0">
+                  <p:tgtEl>
+                    <p:sldTgt/>
+                  </p:tgtEl>
+                </p:cond>
+              </p:prevCondLst>
+              <p:nextCondLst>
+                <p:cond evt="onNext" delay="0">
+                  <p:tgtEl>
+                    <p:sldTgt/>
+                  </p:tgtEl>
+                </p:cond>
+              </p:nextCondLst>
+            </p:seq>
+          </p:childTnLst>
+        </p:cTn>
       </p:par>
     </p:tnLst>
   </p:timing>
@@ -32680,11 +32949,7 @@
           <a:p>
             <a:r>
               <a:rPr lang="en-US" sz="5400" dirty="0" smtClean="0"/>
-              <a:t>New methods to </a:t>
-            </a:r>
-            <a:r>
-              <a:rPr lang="en-US" sz="5400" dirty="0" smtClean="0"/>
-              <a:t>use</a:t>
+              <a:t>New methods to use</a:t>
             </a:r>
           </a:p>
         </p:txBody>

</xml_diff>